<commit_message>
- changed: Zwischenpräsentation -> Analyse von Fehlern + Fehlervorbeugung (verbessert)
</commit_message>
<xml_diff>
--- a/documents/projectmanagement/Praesentationen/Vorstellung_Zwischenpräsentation - Timo.pptx
+++ b/documents/projectmanagement/Praesentationen/Vorstellung_Zwischenpräsentation - Timo.pptx
@@ -131,7 +131,7 @@
   </p:defaultTextStyle>
   <p:extLst>
     <p:ext uri="{EFAFB233-063F-42B5-8137-9DF3F51BA10A}">
-      <p15:sldGuideLst xmlns:p15="http://schemas.microsoft.com/office/powerpoint/2012/main" xmlns=""/>
+      <p15:sldGuideLst xmlns="" xmlns:p15="http://schemas.microsoft.com/office/powerpoint/2012/main"/>
     </p:ext>
   </p:extLst>
 </p:presentation>
@@ -13680,21 +13680,21 @@
     </dgm:pt>
   </dgm:ptLst>
   <dgm:cxnLst>
-    <dgm:cxn modelId="{850F2AF4-9E0C-4B6D-BEC2-EBFCB38F10C1}" type="presOf" srcId="{3142E19D-54ED-4D5F-B1C8-751D212DB0FB}" destId="{C893210D-4879-4DD5-B088-5D8E5992D57B}" srcOrd="0" destOrd="0" presId="urn:microsoft.com/office/officeart/2005/8/layout/radial4"/>
     <dgm:cxn modelId="{44C56E3F-36B0-4030-AA3C-D88BC78AF595}" type="presOf" srcId="{86DB323A-73DC-4D24-A083-62E001995050}" destId="{35C2A99A-00D9-4873-BF91-57CC5CDD6420}" srcOrd="0" destOrd="0" presId="urn:microsoft.com/office/officeart/2005/8/layout/radial4"/>
-    <dgm:cxn modelId="{3DCC5B69-02D3-424C-93D2-6136BAD4C4A2}" srcId="{86DB323A-73DC-4D24-A083-62E001995050}" destId="{B7247DFC-D355-448B-9214-6AA0E881009C}" srcOrd="0" destOrd="0" parTransId="{F8A5DA11-9B74-489C-A302-07D714D9CD5B}" sibTransId="{52D7B1D1-5A0E-4AA5-9DD4-1AFC8D56C813}"/>
-    <dgm:cxn modelId="{1298C251-7E4A-4B07-B619-5F579856FDB5}" srcId="{86DB323A-73DC-4D24-A083-62E001995050}" destId="{3349D365-30DD-46AC-9A03-A8D9A349A53E}" srcOrd="3" destOrd="0" parTransId="{3142E19D-54ED-4D5F-B1C8-751D212DB0FB}" sibTransId="{D9B85E9A-5C03-4B03-A981-2FB9DB12BCBE}"/>
     <dgm:cxn modelId="{8EEFC20C-60BA-4D7F-9C94-258E82EA25BE}" type="presOf" srcId="{408FBC27-3C08-474B-96FC-24A7BAF44899}" destId="{068D7405-A6C9-45DD-A710-1DEB6B3AB9DA}" srcOrd="0" destOrd="0" presId="urn:microsoft.com/office/officeart/2005/8/layout/radial4"/>
     <dgm:cxn modelId="{A9954CE5-562C-4280-9B91-0CEFCF670A2B}" type="presOf" srcId="{12C43100-EEF3-4FE1-AF2F-1BFF73DD3DB9}" destId="{FB4358FC-C359-4CA7-8DC8-E68F921B6C35}" srcOrd="0" destOrd="0" presId="urn:microsoft.com/office/officeart/2005/8/layout/radial4"/>
+    <dgm:cxn modelId="{8D1EF1AB-79A4-478B-B770-55D66312AEAE}" srcId="{85D3EFA7-8BDB-4A5A-882A-EDBF94BF3494}" destId="{86DB323A-73DC-4D24-A083-62E001995050}" srcOrd="0" destOrd="0" parTransId="{1598B80F-D235-4DD7-8B2C-88306356BAA1}" sibTransId="{194954D0-B6E5-4F2C-81EB-002B2BB93D55}"/>
+    <dgm:cxn modelId="{4CE2F67E-3E30-4454-B48D-03235F5DAEF8}" type="presOf" srcId="{B7247DFC-D355-448B-9214-6AA0E881009C}" destId="{3E011A6B-79B3-4D46-95F0-A0F03807531F}" srcOrd="0" destOrd="0" presId="urn:microsoft.com/office/officeart/2005/8/layout/radial4"/>
+    <dgm:cxn modelId="{850F2AF4-9E0C-4B6D-BEC2-EBFCB38F10C1}" type="presOf" srcId="{3142E19D-54ED-4D5F-B1C8-751D212DB0FB}" destId="{C893210D-4879-4DD5-B088-5D8E5992D57B}" srcOrd="0" destOrd="0" presId="urn:microsoft.com/office/officeart/2005/8/layout/radial4"/>
+    <dgm:cxn modelId="{AB5F8FDB-9F37-41C2-83A5-57BDA5977CF2}" type="presOf" srcId="{7AAA3B19-FAC3-4C62-9309-B2DD2BE4A6BC}" destId="{E44501EB-77DB-44A8-9500-C483F073DCB5}" srcOrd="0" destOrd="0" presId="urn:microsoft.com/office/officeart/2005/8/layout/radial4"/>
+    <dgm:cxn modelId="{DBEB4342-59D7-4AFB-92E3-AE5121EE78D4}" type="presOf" srcId="{85D3EFA7-8BDB-4A5A-882A-EDBF94BF3494}" destId="{E0431947-E99A-4790-BD89-FBCD5D78E100}" srcOrd="0" destOrd="0" presId="urn:microsoft.com/office/officeart/2005/8/layout/radial4"/>
+    <dgm:cxn modelId="{271925B9-B006-4FBB-AF8C-D8E63A32A165}" srcId="{86DB323A-73DC-4D24-A083-62E001995050}" destId="{7AAA3B19-FAC3-4C62-9309-B2DD2BE4A6BC}" srcOrd="1" destOrd="0" parTransId="{12C43100-EEF3-4FE1-AF2F-1BFF73DD3DB9}" sibTransId="{F2515C0F-FC73-44BE-A318-8DC9050BDBC3}"/>
+    <dgm:cxn modelId="{1298C251-7E4A-4B07-B619-5F579856FDB5}" srcId="{86DB323A-73DC-4D24-A083-62E001995050}" destId="{3349D365-30DD-46AC-9A03-A8D9A349A53E}" srcOrd="3" destOrd="0" parTransId="{3142E19D-54ED-4D5F-B1C8-751D212DB0FB}" sibTransId="{D9B85E9A-5C03-4B03-A981-2FB9DB12BCBE}"/>
     <dgm:cxn modelId="{09FA4538-A37D-45CF-ABE7-F72A988FA6C8}" type="presOf" srcId="{69A049EF-51F8-4472-AB1D-9DD24EA9510C}" destId="{BD417E97-5549-4F53-AAFC-AE0DAE8D6740}" srcOrd="0" destOrd="0" presId="urn:microsoft.com/office/officeart/2005/8/layout/radial4"/>
-    <dgm:cxn modelId="{4CE2F67E-3E30-4454-B48D-03235F5DAEF8}" type="presOf" srcId="{B7247DFC-D355-448B-9214-6AA0E881009C}" destId="{3E011A6B-79B3-4D46-95F0-A0F03807531F}" srcOrd="0" destOrd="0" presId="urn:microsoft.com/office/officeart/2005/8/layout/radial4"/>
-    <dgm:cxn modelId="{DBEB4342-59D7-4AFB-92E3-AE5121EE78D4}" type="presOf" srcId="{85D3EFA7-8BDB-4A5A-882A-EDBF94BF3494}" destId="{E0431947-E99A-4790-BD89-FBCD5D78E100}" srcOrd="0" destOrd="0" presId="urn:microsoft.com/office/officeart/2005/8/layout/radial4"/>
-    <dgm:cxn modelId="{8D1EF1AB-79A4-478B-B770-55D66312AEAE}" srcId="{85D3EFA7-8BDB-4A5A-882A-EDBF94BF3494}" destId="{86DB323A-73DC-4D24-A083-62E001995050}" srcOrd="0" destOrd="0" parTransId="{1598B80F-D235-4DD7-8B2C-88306356BAA1}" sibTransId="{194954D0-B6E5-4F2C-81EB-002B2BB93D55}"/>
+    <dgm:cxn modelId="{F3A3C72E-D9AC-4A08-9938-81F7E4BC44ED}" type="presOf" srcId="{F8A5DA11-9B74-489C-A302-07D714D9CD5B}" destId="{D40C343F-E9CC-4AE5-8A3B-5C8E2B9D3B89}" srcOrd="0" destOrd="0" presId="urn:microsoft.com/office/officeart/2005/8/layout/radial4"/>
+    <dgm:cxn modelId="{3DCC5B69-02D3-424C-93D2-6136BAD4C4A2}" srcId="{86DB323A-73DC-4D24-A083-62E001995050}" destId="{B7247DFC-D355-448B-9214-6AA0E881009C}" srcOrd="0" destOrd="0" parTransId="{F8A5DA11-9B74-489C-A302-07D714D9CD5B}" sibTransId="{52D7B1D1-5A0E-4AA5-9DD4-1AFC8D56C813}"/>
     <dgm:cxn modelId="{6B01D823-465C-4A8C-9BF1-B5C07707C5B9}" srcId="{86DB323A-73DC-4D24-A083-62E001995050}" destId="{69A049EF-51F8-4472-AB1D-9DD24EA9510C}" srcOrd="2" destOrd="0" parTransId="{408FBC27-3C08-474B-96FC-24A7BAF44899}" sibTransId="{FFBC999E-A277-4A3B-AD02-C85FC1C1DF44}"/>
-    <dgm:cxn modelId="{F3A3C72E-D9AC-4A08-9938-81F7E4BC44ED}" type="presOf" srcId="{F8A5DA11-9B74-489C-A302-07D714D9CD5B}" destId="{D40C343F-E9CC-4AE5-8A3B-5C8E2B9D3B89}" srcOrd="0" destOrd="0" presId="urn:microsoft.com/office/officeart/2005/8/layout/radial4"/>
     <dgm:cxn modelId="{CB570A2F-4AC4-4DFF-BD1F-18A57C9ADFCE}" type="presOf" srcId="{3349D365-30DD-46AC-9A03-A8D9A349A53E}" destId="{D8484C4E-C79B-412F-9987-C2485DB65F27}" srcOrd="0" destOrd="0" presId="urn:microsoft.com/office/officeart/2005/8/layout/radial4"/>
-    <dgm:cxn modelId="{271925B9-B006-4FBB-AF8C-D8E63A32A165}" srcId="{86DB323A-73DC-4D24-A083-62E001995050}" destId="{7AAA3B19-FAC3-4C62-9309-B2DD2BE4A6BC}" srcOrd="1" destOrd="0" parTransId="{12C43100-EEF3-4FE1-AF2F-1BFF73DD3DB9}" sibTransId="{F2515C0F-FC73-44BE-A318-8DC9050BDBC3}"/>
-    <dgm:cxn modelId="{AB5F8FDB-9F37-41C2-83A5-57BDA5977CF2}" type="presOf" srcId="{7AAA3B19-FAC3-4C62-9309-B2DD2BE4A6BC}" destId="{E44501EB-77DB-44A8-9500-C483F073DCB5}" srcOrd="0" destOrd="0" presId="urn:microsoft.com/office/officeart/2005/8/layout/radial4"/>
     <dgm:cxn modelId="{69E4204F-7204-47A3-8ACB-1BF93741FCE3}" type="presParOf" srcId="{E0431947-E99A-4790-BD89-FBCD5D78E100}" destId="{35C2A99A-00D9-4873-BF91-57CC5CDD6420}" srcOrd="0" destOrd="0" presId="urn:microsoft.com/office/officeart/2005/8/layout/radial4"/>
     <dgm:cxn modelId="{A92947EF-2D05-44EA-BFAD-67E7614504ED}" type="presParOf" srcId="{E0431947-E99A-4790-BD89-FBCD5D78E100}" destId="{D40C343F-E9CC-4AE5-8A3B-5C8E2B9D3B89}" srcOrd="1" destOrd="0" presId="urn:microsoft.com/office/officeart/2005/8/layout/radial4"/>
     <dgm:cxn modelId="{9795D822-FF72-455E-BEE9-E38DC6473993}" type="presParOf" srcId="{E0431947-E99A-4790-BD89-FBCD5D78E100}" destId="{3E011A6B-79B3-4D46-95F0-A0F03807531F}" srcOrd="2" destOrd="0" presId="urn:microsoft.com/office/officeart/2005/8/layout/radial4"/>
@@ -15190,6 +15190,13 @@
         </dgm:presLayoutVars>
       </dgm:prSet>
       <dgm:spPr/>
+      <dgm:t>
+        <a:bodyPr/>
+        <a:lstStyle/>
+        <a:p>
+          <a:endParaRPr lang="de-DE"/>
+        </a:p>
+      </dgm:t>
     </dgm:pt>
     <dgm:pt modelId="{6A0B9FF1-FD29-4229-B1EF-5BCBE9D23B49}" type="pres">
       <dgm:prSet presAssocID="{1899F7D5-B232-4DD3-A10D-917967698CEE}" presName="node" presStyleLbl="node1" presStyleIdx="0" presStyleCnt="5">
@@ -15213,6 +15220,13 @@
     <dgm:pt modelId="{6F1A9F3C-F4D4-4AF6-BE93-D00767E52125}" type="pres">
       <dgm:prSet presAssocID="{C4F4BAE3-7B8D-4F1B-A760-367FADA2E34B}" presName="sibTrans" presStyleLbl="sibTrans1D1" presStyleIdx="0" presStyleCnt="5"/>
       <dgm:spPr/>
+      <dgm:t>
+        <a:bodyPr/>
+        <a:lstStyle/>
+        <a:p>
+          <a:endParaRPr lang="de-DE"/>
+        </a:p>
+      </dgm:t>
     </dgm:pt>
     <dgm:pt modelId="{FF988678-DBA2-47AE-B9E4-B0D78678A46C}" type="pres">
       <dgm:prSet presAssocID="{6406FD53-5A33-4730-9A2C-2B66B18516AD}" presName="node" presStyleLbl="node1" presStyleIdx="1" presStyleCnt="5">
@@ -15221,6 +15235,13 @@
         </dgm:presLayoutVars>
       </dgm:prSet>
       <dgm:spPr/>
+      <dgm:t>
+        <a:bodyPr/>
+        <a:lstStyle/>
+        <a:p>
+          <a:endParaRPr lang="de-DE"/>
+        </a:p>
+      </dgm:t>
     </dgm:pt>
     <dgm:pt modelId="{6C01710E-BA62-4C4F-9638-74DF4F023288}" type="pres">
       <dgm:prSet presAssocID="{6406FD53-5A33-4730-9A2C-2B66B18516AD}" presName="spNode" presStyleCnt="0"/>
@@ -15229,6 +15250,13 @@
     <dgm:pt modelId="{A0DF3ED5-C40B-49CB-981E-FB6EBC569EB6}" type="pres">
       <dgm:prSet presAssocID="{25D7715D-2262-4632-A02C-563B569A9A8E}" presName="sibTrans" presStyleLbl="sibTrans1D1" presStyleIdx="1" presStyleCnt="5"/>
       <dgm:spPr/>
+      <dgm:t>
+        <a:bodyPr/>
+        <a:lstStyle/>
+        <a:p>
+          <a:endParaRPr lang="de-DE"/>
+        </a:p>
+      </dgm:t>
     </dgm:pt>
     <dgm:pt modelId="{F74CB766-2044-4151-99B4-9DBB7034409A}" type="pres">
       <dgm:prSet presAssocID="{0A87F8AF-FFDB-41F8-A18F-0843868918A9}" presName="node" presStyleLbl="node1" presStyleIdx="2" presStyleCnt="5">
@@ -15237,6 +15265,13 @@
         </dgm:presLayoutVars>
       </dgm:prSet>
       <dgm:spPr/>
+      <dgm:t>
+        <a:bodyPr/>
+        <a:lstStyle/>
+        <a:p>
+          <a:endParaRPr lang="de-DE"/>
+        </a:p>
+      </dgm:t>
     </dgm:pt>
     <dgm:pt modelId="{FB7E3E68-A51A-4430-93BA-58D14595B9F8}" type="pres">
       <dgm:prSet presAssocID="{0A87F8AF-FFDB-41F8-A18F-0843868918A9}" presName="spNode" presStyleCnt="0"/>
@@ -15245,6 +15280,13 @@
     <dgm:pt modelId="{E322F4E6-E40C-4C63-A024-FF8B52362C6F}" type="pres">
       <dgm:prSet presAssocID="{3AEEF16E-CD08-41E7-AB60-8E8635A8D2DE}" presName="sibTrans" presStyleLbl="sibTrans1D1" presStyleIdx="2" presStyleCnt="5"/>
       <dgm:spPr/>
+      <dgm:t>
+        <a:bodyPr/>
+        <a:lstStyle/>
+        <a:p>
+          <a:endParaRPr lang="de-DE"/>
+        </a:p>
+      </dgm:t>
     </dgm:pt>
     <dgm:pt modelId="{74566C18-C594-4F85-8F8E-D31E567F586B}" type="pres">
       <dgm:prSet presAssocID="{384136EF-CBAD-4C71-A918-2D101119F739}" presName="node" presStyleLbl="node1" presStyleIdx="3" presStyleCnt="5">
@@ -15268,6 +15310,13 @@
     <dgm:pt modelId="{282AF9E9-5959-431D-B93D-F568754B87E6}" type="pres">
       <dgm:prSet presAssocID="{44EA5378-5D92-4818-A713-59EA819BB645}" presName="sibTrans" presStyleLbl="sibTrans1D1" presStyleIdx="3" presStyleCnt="5"/>
       <dgm:spPr/>
+      <dgm:t>
+        <a:bodyPr/>
+        <a:lstStyle/>
+        <a:p>
+          <a:endParaRPr lang="de-DE"/>
+        </a:p>
+      </dgm:t>
     </dgm:pt>
     <dgm:pt modelId="{2E8BEFA4-CB7C-4BD1-B178-B835DC650A0A}" type="pres">
       <dgm:prSet presAssocID="{9241D05E-6DED-4667-AEAD-B7D1DC0BB56A}" presName="node" presStyleLbl="node1" presStyleIdx="4" presStyleCnt="5">
@@ -15276,6 +15325,13 @@
         </dgm:presLayoutVars>
       </dgm:prSet>
       <dgm:spPr/>
+      <dgm:t>
+        <a:bodyPr/>
+        <a:lstStyle/>
+        <a:p>
+          <a:endParaRPr lang="de-DE"/>
+        </a:p>
+      </dgm:t>
     </dgm:pt>
     <dgm:pt modelId="{383820D4-5D8B-4193-BEA5-4D7813A70E3D}" type="pres">
       <dgm:prSet presAssocID="{9241D05E-6DED-4667-AEAD-B7D1DC0BB56A}" presName="spNode" presStyleCnt="0"/>
@@ -15284,6 +15340,13 @@
     <dgm:pt modelId="{88F95BFB-813C-43F9-BD34-2E6FACF40B9A}" type="pres">
       <dgm:prSet presAssocID="{39A76DCF-F59D-483A-8E0C-6DBAEA75631E}" presName="sibTrans" presStyleLbl="sibTrans1D1" presStyleIdx="4" presStyleCnt="5"/>
       <dgm:spPr/>
+      <dgm:t>
+        <a:bodyPr/>
+        <a:lstStyle/>
+        <a:p>
+          <a:endParaRPr lang="de-DE"/>
+        </a:p>
+      </dgm:t>
     </dgm:pt>
   </dgm:ptLst>
   <dgm:cxnLst>
@@ -15292,8 +15355,8 @@
     <dgm:cxn modelId="{5512C18C-482F-4C31-9E50-9A066F0BE2F8}" type="presOf" srcId="{9E3CB3FB-C823-4E0D-A01E-C6F0724CFB3E}" destId="{308885D4-CFBA-4059-8DA1-2AC7C29935EB}" srcOrd="0" destOrd="0" presId="urn:microsoft.com/office/officeart/2005/8/layout/cycle5"/>
     <dgm:cxn modelId="{5C1E8951-3960-4AF5-BA1A-C678839684AC}" type="presOf" srcId="{3AEEF16E-CD08-41E7-AB60-8E8635A8D2DE}" destId="{E322F4E6-E40C-4C63-A024-FF8B52362C6F}" srcOrd="0" destOrd="0" presId="urn:microsoft.com/office/officeart/2005/8/layout/cycle5"/>
     <dgm:cxn modelId="{CE07B894-6271-46C3-9008-BD813AF0B85B}" type="presOf" srcId="{6406FD53-5A33-4730-9A2C-2B66B18516AD}" destId="{FF988678-DBA2-47AE-B9E4-B0D78678A46C}" srcOrd="0" destOrd="0" presId="urn:microsoft.com/office/officeart/2005/8/layout/cycle5"/>
+    <dgm:cxn modelId="{C9E7209D-C286-46EF-8ED7-FEC44FBCDF57}" srcId="{9E3CB3FB-C823-4E0D-A01E-C6F0724CFB3E}" destId="{9241D05E-6DED-4667-AEAD-B7D1DC0BB56A}" srcOrd="4" destOrd="0" parTransId="{7AB63699-B081-4515-A9B9-F1B4383D4A79}" sibTransId="{39A76DCF-F59D-483A-8E0C-6DBAEA75631E}"/>
     <dgm:cxn modelId="{AA8BA5F2-98C6-41B9-9841-A4E946843789}" srcId="{9E3CB3FB-C823-4E0D-A01E-C6F0724CFB3E}" destId="{1899F7D5-B232-4DD3-A10D-917967698CEE}" srcOrd="0" destOrd="0" parTransId="{319B0E1A-6811-4B88-B9D4-022C13EF7C02}" sibTransId="{C4F4BAE3-7B8D-4F1B-A760-367FADA2E34B}"/>
-    <dgm:cxn modelId="{C9E7209D-C286-46EF-8ED7-FEC44FBCDF57}" srcId="{9E3CB3FB-C823-4E0D-A01E-C6F0724CFB3E}" destId="{9241D05E-6DED-4667-AEAD-B7D1DC0BB56A}" srcOrd="4" destOrd="0" parTransId="{7AB63699-B081-4515-A9B9-F1B4383D4A79}" sibTransId="{39A76DCF-F59D-483A-8E0C-6DBAEA75631E}"/>
     <dgm:cxn modelId="{3C802CF1-C692-4F37-B98E-DC8DDA7665C9}" srcId="{9E3CB3FB-C823-4E0D-A01E-C6F0724CFB3E}" destId="{6406FD53-5A33-4730-9A2C-2B66B18516AD}" srcOrd="1" destOrd="0" parTransId="{FFD915B2-C81C-45F8-811A-2CB0F0CEB040}" sibTransId="{25D7715D-2262-4632-A02C-563B569A9A8E}"/>
     <dgm:cxn modelId="{1D91F576-B9B7-4AFD-9935-9D8A8BBF3F79}" type="presOf" srcId="{0A87F8AF-FFDB-41F8-A18F-0843868918A9}" destId="{F74CB766-2044-4151-99B4-9DBB7034409A}" srcOrd="0" destOrd="0" presId="urn:microsoft.com/office/officeart/2005/8/layout/cycle5"/>
     <dgm:cxn modelId="{A35B0C27-7B90-4905-878C-635E4A67D7D0}" srcId="{9E3CB3FB-C823-4E0D-A01E-C6F0724CFB3E}" destId="{384136EF-CBAD-4C71-A918-2D101119F739}" srcOrd="3" destOrd="0" parTransId="{19361F74-533A-424F-9915-CB10E007C10E}" sibTransId="{44EA5378-5D92-4818-A713-59EA819BB645}"/>
@@ -15389,7 +15452,7 @@
         <a:p>
           <a:r>
             <a:rPr lang="de-DE" dirty="0" smtClean="0"/>
-            <a:t>Potentiell oder</a:t>
+            <a:t>Fehlkommunikation</a:t>
           </a:r>
           <a:endParaRPr lang="de-DE" dirty="0"/>
         </a:p>
@@ -15407,43 +15470,6 @@
       </dgm:t>
     </dgm:pt>
     <dgm:pt modelId="{A80C80C3-42B9-475F-B049-97F98E9AF30C}" type="sibTrans" cxnId="{BD1A8FBD-7ADE-4F8D-8515-B0876662BEED}">
-      <dgm:prSet/>
-      <dgm:spPr/>
-      <dgm:t>
-        <a:bodyPr/>
-        <a:lstStyle/>
-        <a:p>
-          <a:endParaRPr lang="de-DE"/>
-        </a:p>
-      </dgm:t>
-    </dgm:pt>
-    <dgm:pt modelId="{4588A537-56B9-4F2E-B1C2-F8C15C3E0352}">
-      <dgm:prSet phldrT="[Text]"/>
-      <dgm:spPr/>
-      <dgm:t>
-        <a:bodyPr/>
-        <a:lstStyle/>
-        <a:p>
-          <a:r>
-            <a:rPr lang="de-DE" dirty="0" smtClean="0"/>
-            <a:t>Tatsächlich</a:t>
-          </a:r>
-          <a:endParaRPr lang="de-DE" dirty="0"/>
-        </a:p>
-      </dgm:t>
-    </dgm:pt>
-    <dgm:pt modelId="{CFCB1028-2F25-48CD-AB35-77E7AF88349D}" type="parTrans" cxnId="{A351B0A7-3078-4DBD-A6C7-CC1A5E402240}">
-      <dgm:prSet/>
-      <dgm:spPr/>
-      <dgm:t>
-        <a:bodyPr/>
-        <a:lstStyle/>
-        <a:p>
-          <a:endParaRPr lang="de-DE"/>
-        </a:p>
-      </dgm:t>
-    </dgm:pt>
-    <dgm:pt modelId="{4D9738CF-0793-4A28-B7D6-10FF45C1181E}" type="sibTrans" cxnId="{A351B0A7-3078-4DBD-A6C7-CC1A5E402240}">
       <dgm:prSet/>
       <dgm:spPr/>
       <dgm:t>
@@ -15500,7 +15526,7 @@
         <a:p>
           <a:r>
             <a:rPr lang="de-DE" dirty="0" smtClean="0"/>
-            <a:t>Verlust von Arbeitszeit</a:t>
+            <a:t>Arbeit wird doppelt ausgeführt</a:t>
           </a:r>
           <a:endParaRPr lang="de-DE" dirty="0"/>
         </a:p>
@@ -15537,7 +15563,11 @@
         <a:p>
           <a:r>
             <a:rPr lang="de-DE" dirty="0" smtClean="0"/>
-            <a:t>Überflüssige Ausgabe</a:t>
+            <a:t>Überflüssige </a:t>
+          </a:r>
+          <a:r>
+            <a:rPr lang="de-DE" dirty="0" smtClean="0"/>
+            <a:t>Kosten und Personalaufwand</a:t>
           </a:r>
           <a:endParaRPr lang="de-DE" dirty="0"/>
         </a:p>
@@ -15611,7 +15641,7 @@
         <a:p>
           <a:r>
             <a:rPr lang="de-DE" dirty="0" smtClean="0"/>
-            <a:t>Fehlkommunikation</a:t>
+            <a:t>Unklare Aufgabenverteilung</a:t>
           </a:r>
           <a:endParaRPr lang="de-DE" dirty="0"/>
         </a:p>
@@ -15960,6 +15990,43 @@
         </a:p>
       </dgm:t>
     </dgm:pt>
+    <dgm:pt modelId="{6E51C9A9-A71D-4658-9C07-5643FC022CCA}">
+      <dgm:prSet/>
+      <dgm:spPr/>
+      <dgm:t>
+        <a:bodyPr/>
+        <a:lstStyle/>
+        <a:p>
+          <a:r>
+            <a:rPr lang="de-DE" dirty="0" smtClean="0"/>
+            <a:t>Aufgabenverteilung verbessern</a:t>
+          </a:r>
+          <a:endParaRPr lang="de-DE" dirty="0"/>
+        </a:p>
+      </dgm:t>
+    </dgm:pt>
+    <dgm:pt modelId="{23B5B79A-9A06-4D2C-8E42-1863CCD0EB07}" type="parTrans" cxnId="{B1EF8B6B-0846-4002-9390-76C06E19D65B}">
+      <dgm:prSet/>
+      <dgm:spPr/>
+      <dgm:t>
+        <a:bodyPr/>
+        <a:lstStyle/>
+        <a:p>
+          <a:endParaRPr lang="de-DE"/>
+        </a:p>
+      </dgm:t>
+    </dgm:pt>
+    <dgm:pt modelId="{79307198-8296-4976-A1EA-B662329FD8B2}" type="sibTrans" cxnId="{B1EF8B6B-0846-4002-9390-76C06E19D65B}">
+      <dgm:prSet/>
+      <dgm:spPr/>
+      <dgm:t>
+        <a:bodyPr/>
+        <a:lstStyle/>
+        <a:p>
+          <a:endParaRPr lang="de-DE"/>
+        </a:p>
+      </dgm:t>
+    </dgm:pt>
     <dgm:pt modelId="{393CE640-1557-4225-A4C1-46C0D108236E}" type="pres">
       <dgm:prSet presAssocID="{E04A4E85-1077-47C7-9B0F-487F29C75534}" presName="Name0" presStyleCnt="0">
         <dgm:presLayoutVars>
@@ -15969,6 +16036,13 @@
         </dgm:presLayoutVars>
       </dgm:prSet>
       <dgm:spPr/>
+      <dgm:t>
+        <a:bodyPr/>
+        <a:lstStyle/>
+        <a:p>
+          <a:endParaRPr lang="de-DE"/>
+        </a:p>
+      </dgm:t>
     </dgm:pt>
     <dgm:pt modelId="{60838942-8CFC-4677-9766-0D69F95F91A1}" type="pres">
       <dgm:prSet presAssocID="{E04A4E85-1077-47C7-9B0F-487F29C75534}" presName="tSp" presStyleCnt="0"/>
@@ -15997,6 +16071,13 @@
         </dgm:presLayoutVars>
       </dgm:prSet>
       <dgm:spPr/>
+      <dgm:t>
+        <a:bodyPr/>
+        <a:lstStyle/>
+        <a:p>
+          <a:endParaRPr lang="de-DE"/>
+        </a:p>
+      </dgm:t>
     </dgm:pt>
     <dgm:pt modelId="{5B477C0A-EBE8-4554-AF90-A537B9A97AF3}" type="pres">
       <dgm:prSet presAssocID="{1858F41E-B0BA-4600-A943-81DE031E5BE1}" presName="childNode1tx" presStyleLbl="bgAcc1" presStyleIdx="0" presStyleCnt="5">
@@ -16005,6 +16086,13 @@
         </dgm:presLayoutVars>
       </dgm:prSet>
       <dgm:spPr/>
+      <dgm:t>
+        <a:bodyPr/>
+        <a:lstStyle/>
+        <a:p>
+          <a:endParaRPr lang="de-DE"/>
+        </a:p>
+      </dgm:t>
     </dgm:pt>
     <dgm:pt modelId="{711766B0-CCA6-41DD-86FA-A907B57829EC}" type="pres">
       <dgm:prSet presAssocID="{1858F41E-B0BA-4600-A943-81DE031E5BE1}" presName="parentNode1" presStyleLbl="node1" presStyleIdx="0" presStyleCnt="5">
@@ -16029,6 +16117,13 @@
     <dgm:pt modelId="{4FA19D17-4F6A-4352-8E82-51779E218641}" type="pres">
       <dgm:prSet presAssocID="{44567BEA-A579-4C61-8639-63B78654D416}" presName="Name9" presStyleLbl="sibTrans2D1" presStyleIdx="0" presStyleCnt="4"/>
       <dgm:spPr/>
+      <dgm:t>
+        <a:bodyPr/>
+        <a:lstStyle/>
+        <a:p>
+          <a:endParaRPr lang="de-DE"/>
+        </a:p>
+      </dgm:t>
     </dgm:pt>
     <dgm:pt modelId="{58E7B18B-37C1-463A-BA4E-34603F64184F}" type="pres">
       <dgm:prSet presAssocID="{87BD4B6F-D630-472F-8353-00B19E50137B}" presName="composite2" presStyleCnt="0"/>
@@ -16076,6 +16171,13 @@
         </dgm:presLayoutVars>
       </dgm:prSet>
       <dgm:spPr/>
+      <dgm:t>
+        <a:bodyPr/>
+        <a:lstStyle/>
+        <a:p>
+          <a:endParaRPr lang="de-DE"/>
+        </a:p>
+      </dgm:t>
     </dgm:pt>
     <dgm:pt modelId="{BC9720BD-74F2-40B5-BA50-99BBF140947B}" type="pres">
       <dgm:prSet presAssocID="{87BD4B6F-D630-472F-8353-00B19E50137B}" presName="connSite2" presStyleCnt="0"/>
@@ -16084,6 +16186,13 @@
     <dgm:pt modelId="{CBC7C94E-BBEC-4573-8225-71814017665B}" type="pres">
       <dgm:prSet presAssocID="{64393453-549D-4407-8EBA-26EEC2B88566}" presName="Name18" presStyleLbl="sibTrans2D1" presStyleIdx="1" presStyleCnt="4"/>
       <dgm:spPr/>
+      <dgm:t>
+        <a:bodyPr/>
+        <a:lstStyle/>
+        <a:p>
+          <a:endParaRPr lang="de-DE"/>
+        </a:p>
+      </dgm:t>
     </dgm:pt>
     <dgm:pt modelId="{C53DA402-2FC5-4744-A5EB-53AE919D9E4E}" type="pres">
       <dgm:prSet presAssocID="{5CC6BBED-AC87-4545-BAEE-FF2A0F4D3F07}" presName="composite1" presStyleCnt="0"/>
@@ -16146,6 +16255,13 @@
     <dgm:pt modelId="{F71DF23A-208F-4CA4-9D7D-547D97BDB3CA}" type="pres">
       <dgm:prSet presAssocID="{D13602AF-472E-404C-A3EA-26CE1625C3D3}" presName="Name9" presStyleLbl="sibTrans2D1" presStyleIdx="2" presStyleCnt="4"/>
       <dgm:spPr/>
+      <dgm:t>
+        <a:bodyPr/>
+        <a:lstStyle/>
+        <a:p>
+          <a:endParaRPr lang="de-DE"/>
+        </a:p>
+      </dgm:t>
     </dgm:pt>
     <dgm:pt modelId="{2F56D5B5-01C4-4A22-BF98-5C9B3E6B7027}" type="pres">
       <dgm:prSet presAssocID="{D800FD87-6220-4750-9CC7-C0C3265BD5ED}" presName="composite2" presStyleCnt="0"/>
@@ -16193,6 +16309,13 @@
         </dgm:presLayoutVars>
       </dgm:prSet>
       <dgm:spPr/>
+      <dgm:t>
+        <a:bodyPr/>
+        <a:lstStyle/>
+        <a:p>
+          <a:endParaRPr lang="de-DE"/>
+        </a:p>
+      </dgm:t>
     </dgm:pt>
     <dgm:pt modelId="{2CCF6F9A-D2FF-4FE2-9EE2-95D998072331}" type="pres">
       <dgm:prSet presAssocID="{D800FD87-6220-4750-9CC7-C0C3265BD5ED}" presName="connSite2" presStyleCnt="0"/>
@@ -16201,6 +16324,13 @@
     <dgm:pt modelId="{D91A94C6-C14F-4630-82D6-A7B8B1B1ABA5}" type="pres">
       <dgm:prSet presAssocID="{5C715AA8-1C71-4869-A01B-9D13710CE975}" presName="Name18" presStyleLbl="sibTrans2D1" presStyleIdx="3" presStyleCnt="4"/>
       <dgm:spPr/>
+      <dgm:t>
+        <a:bodyPr/>
+        <a:lstStyle/>
+        <a:p>
+          <a:endParaRPr lang="de-DE"/>
+        </a:p>
+      </dgm:t>
     </dgm:pt>
     <dgm:pt modelId="{1AFBABD8-C875-44F5-A6BF-60A18B6566F1}" type="pres">
       <dgm:prSet presAssocID="{6A5D37F7-EC83-4980-84EF-9F8F267C8D88}" presName="composite1" presStyleCnt="0"/>
@@ -16248,6 +16378,13 @@
         </dgm:presLayoutVars>
       </dgm:prSet>
       <dgm:spPr/>
+      <dgm:t>
+        <a:bodyPr/>
+        <a:lstStyle/>
+        <a:p>
+          <a:endParaRPr lang="de-DE"/>
+        </a:p>
+      </dgm:t>
     </dgm:pt>
     <dgm:pt modelId="{B389F54C-7366-420E-A190-918C2C49358A}" type="pres">
       <dgm:prSet presAssocID="{6A5D37F7-EC83-4980-84EF-9F8F267C8D88}" presName="connSite1" presStyleCnt="0"/>
@@ -16255,57 +16392,57 @@
     </dgm:pt>
   </dgm:ptLst>
   <dgm:cxnLst>
+    <dgm:cxn modelId="{C1B59F88-676A-4D50-BF05-C77C12507069}" type="presOf" srcId="{55334AD3-173A-4A1C-BA17-E44B6DA013B3}" destId="{E101DFCC-1747-4432-8B28-F73A3841A546}" srcOrd="0" destOrd="0" presId="urn:microsoft.com/office/officeart/2005/8/layout/hProcess4"/>
+    <dgm:cxn modelId="{576B947F-4CCF-4983-BEA3-CEB0EEA3EB86}" type="presOf" srcId="{1F9B6F6D-8623-4F7E-94B2-5C3A9851F9CE}" destId="{E2F4E1F7-B043-4052-8130-06CD2056F834}" srcOrd="0" destOrd="0" presId="urn:microsoft.com/office/officeart/2005/8/layout/hProcess4"/>
+    <dgm:cxn modelId="{7D1653FF-2ACE-4196-AB84-A4E50CB39DED}" srcId="{E04A4E85-1077-47C7-9B0F-487F29C75534}" destId="{5CC6BBED-AC87-4545-BAEE-FF2A0F4D3F07}" srcOrd="2" destOrd="0" parTransId="{06408262-1922-47F8-9E9F-15CF6AAEF1D0}" sibTransId="{D13602AF-472E-404C-A3EA-26CE1625C3D3}"/>
+    <dgm:cxn modelId="{3B93E53D-A372-432A-8099-BF8B99C15C03}" type="presOf" srcId="{607C955B-3A62-440C-BA3A-68D799E8A48B}" destId="{A6A67DEB-89E3-4CE3-A2F6-73364D7D0930}" srcOrd="1" destOrd="1" presId="urn:microsoft.com/office/officeart/2005/8/layout/hProcess4"/>
+    <dgm:cxn modelId="{C9C41B4A-50D0-456A-A084-A055EA9C6021}" srcId="{87BD4B6F-D630-472F-8353-00B19E50137B}" destId="{03F80C97-478D-4C67-B13F-14EBB8805D5C}" srcOrd="0" destOrd="0" parTransId="{B2D96D3F-4507-4D63-BB36-4FDB0E249963}" sibTransId="{7BB07F6E-B506-4462-975D-92E293DED439}"/>
+    <dgm:cxn modelId="{DD630588-ED57-49C7-84B3-094B4BAEB359}" srcId="{D800FD87-6220-4750-9CC7-C0C3265BD5ED}" destId="{39C0D49A-405F-463A-B390-FE360DFE4B4C}" srcOrd="1" destOrd="0" parTransId="{4011D41C-40D1-4121-B3F9-B567F4A954F6}" sibTransId="{C8C40A60-3C43-46B5-A2BB-09E7462AFCB9}"/>
     <dgm:cxn modelId="{BD1A8FBD-7ADE-4F8D-8515-B0876662BEED}" srcId="{1858F41E-B0BA-4600-A943-81DE031E5BE1}" destId="{8B5371D9-60D3-4D83-B3B5-2E8B02ABE5A6}" srcOrd="1" destOrd="0" parTransId="{48FAD6AF-C337-449E-8B74-11C4B0553A7E}" sibTransId="{A80C80C3-42B9-475F-B049-97F98E9AF30C}"/>
+    <dgm:cxn modelId="{F4544BB3-8051-4D76-A2A9-EEB4F7A2C037}" type="presOf" srcId="{6E51C9A9-A71D-4658-9C07-5643FC022CCA}" destId="{E2F4E1F7-B043-4052-8130-06CD2056F834}" srcOrd="0" destOrd="3" presId="urn:microsoft.com/office/officeart/2005/8/layout/hProcess4"/>
+    <dgm:cxn modelId="{4816909C-92F5-46D7-897A-66CB301ED696}" type="presOf" srcId="{1F9B6F6D-8623-4F7E-94B2-5C3A9851F9CE}" destId="{A6A67DEB-89E3-4CE3-A2F6-73364D7D0930}" srcOrd="1" destOrd="0" presId="urn:microsoft.com/office/officeart/2005/8/layout/hProcess4"/>
+    <dgm:cxn modelId="{23A4FADD-070B-4DC5-A2C0-82DD9EB11618}" type="presOf" srcId="{8D70053F-830B-40F3-9B0D-41F4237127B2}" destId="{8BD0305A-E64E-4D62-987A-B210F4E1E393}" srcOrd="1" destOrd="0" presId="urn:microsoft.com/office/officeart/2005/8/layout/hProcess4"/>
+    <dgm:cxn modelId="{D2E51AA0-815A-44CA-94B9-4B9F2D4E6BE2}" type="presOf" srcId="{5CC6BBED-AC87-4545-BAEE-FF2A0F4D3F07}" destId="{8F8AA5C5-6C5C-4954-A978-6E18B7094053}" srcOrd="0" destOrd="0" presId="urn:microsoft.com/office/officeart/2005/8/layout/hProcess4"/>
+    <dgm:cxn modelId="{36A272B5-220B-4AD1-9357-C1B62B72CA70}" type="presOf" srcId="{CD106A02-6215-4501-94CA-2739EAE709C1}" destId="{B178EA76-E479-469E-BA4E-12609F207857}" srcOrd="1" destOrd="0" presId="urn:microsoft.com/office/officeart/2005/8/layout/hProcess4"/>
+    <dgm:cxn modelId="{CA4A1DD4-A16C-47B0-A93D-3AC1FD962E1A}" type="presOf" srcId="{6E51C9A9-A71D-4658-9C07-5643FC022CCA}" destId="{A6A67DEB-89E3-4CE3-A2F6-73364D7D0930}" srcOrd="1" destOrd="3" presId="urn:microsoft.com/office/officeart/2005/8/layout/hProcess4"/>
+    <dgm:cxn modelId="{6CB46209-23FB-4DD4-8DEA-57A5AFC7D26C}" type="presOf" srcId="{D13602AF-472E-404C-A3EA-26CE1625C3D3}" destId="{F71DF23A-208F-4CA4-9D7D-547D97BDB3CA}" srcOrd="0" destOrd="0" presId="urn:microsoft.com/office/officeart/2005/8/layout/hProcess4"/>
+    <dgm:cxn modelId="{2ABB1A74-61D9-4674-8D1E-9B2C8C710173}" type="presOf" srcId="{03F80C97-478D-4C67-B13F-14EBB8805D5C}" destId="{02D98D07-D26D-4347-B376-D5DD10237903}" srcOrd="0" destOrd="0" presId="urn:microsoft.com/office/officeart/2005/8/layout/hProcess4"/>
+    <dgm:cxn modelId="{B1EF8B6B-0846-4002-9390-76C06E19D65B}" srcId="{6A5D37F7-EC83-4980-84EF-9F8F267C8D88}" destId="{6E51C9A9-A71D-4658-9C07-5643FC022CCA}" srcOrd="3" destOrd="0" parTransId="{23B5B79A-9A06-4D2C-8E42-1863CCD0EB07}" sibTransId="{79307198-8296-4976-A1EA-B662329FD8B2}"/>
+    <dgm:cxn modelId="{4948FDEA-0A9C-4243-846A-69B25D9F57CE}" srcId="{6A5D37F7-EC83-4980-84EF-9F8F267C8D88}" destId="{3157C5D2-ED6B-40EC-8A28-60A323105F7D}" srcOrd="2" destOrd="0" parTransId="{5C07330F-A45C-4A90-AF33-996238292C2B}" sibTransId="{C782C435-F5FA-4AE7-993B-434A126A0862}"/>
+    <dgm:cxn modelId="{414558B7-C55B-4086-9DF9-F5BBDB364310}" type="presOf" srcId="{64393453-549D-4407-8EBA-26EEC2B88566}" destId="{CBC7C94E-BBEC-4573-8225-71814017665B}" srcOrd="0" destOrd="0" presId="urn:microsoft.com/office/officeart/2005/8/layout/hProcess4"/>
+    <dgm:cxn modelId="{9144F25C-9897-47DC-8EEE-AD2C8CB4B3F1}" type="presOf" srcId="{4D9630B2-2350-41B2-9AE6-FFA1D674999F}" destId="{02D98D07-D26D-4347-B376-D5DD10237903}" srcOrd="0" destOrd="1" presId="urn:microsoft.com/office/officeart/2005/8/layout/hProcess4"/>
+    <dgm:cxn modelId="{C2A1E115-4A38-461A-A5E9-411D411C32C9}" type="presOf" srcId="{5C715AA8-1C71-4869-A01B-9D13710CE975}" destId="{D91A94C6-C14F-4630-82D6-A7B8B1B1ABA5}" srcOrd="0" destOrd="0" presId="urn:microsoft.com/office/officeart/2005/8/layout/hProcess4"/>
     <dgm:cxn modelId="{AD8CE1DD-40B1-4E7C-ABEB-E22B5007B12D}" srcId="{6A5D37F7-EC83-4980-84EF-9F8F267C8D88}" destId="{607C955B-3A62-440C-BA3A-68D799E8A48B}" srcOrd="1" destOrd="0" parTransId="{72D85DBD-7D5C-4683-92DC-6B18D1D5E175}" sibTransId="{EEF7A0A6-2122-439B-97A9-25EA9979341E}"/>
-    <dgm:cxn modelId="{6CB46209-23FB-4DD4-8DEA-57A5AFC7D26C}" type="presOf" srcId="{D13602AF-472E-404C-A3EA-26CE1625C3D3}" destId="{F71DF23A-208F-4CA4-9D7D-547D97BDB3CA}" srcOrd="0" destOrd="0" presId="urn:microsoft.com/office/officeart/2005/8/layout/hProcess4"/>
+    <dgm:cxn modelId="{A5EF33A6-E1C0-481C-A6F1-C86393E8FF36}" type="presOf" srcId="{1858F41E-B0BA-4600-A943-81DE031E5BE1}" destId="{711766B0-CCA6-41DD-86FA-A907B57829EC}" srcOrd="0" destOrd="0" presId="urn:microsoft.com/office/officeart/2005/8/layout/hProcess4"/>
+    <dgm:cxn modelId="{92EF41C9-EC89-4234-B6AA-E8DB985CDC99}" srcId="{D800FD87-6220-4750-9CC7-C0C3265BD5ED}" destId="{CD106A02-6215-4501-94CA-2739EAE709C1}" srcOrd="0" destOrd="0" parTransId="{497017FC-E48F-430E-A87A-59BA0B55F749}" sibTransId="{061FA615-A06D-4D99-97B5-19323996A3DC}"/>
+    <dgm:cxn modelId="{6F1AFB53-F920-4747-9CA8-1D5DA2ABD6B6}" type="presOf" srcId="{5370F1C0-987A-4EA2-8B22-B0C9A7765A8F}" destId="{8BD0305A-E64E-4D62-987A-B210F4E1E393}" srcOrd="1" destOrd="1" presId="urn:microsoft.com/office/officeart/2005/8/layout/hProcess4"/>
+    <dgm:cxn modelId="{0DE1679D-0556-4D0B-A7C3-F38695BD2611}" type="presOf" srcId="{CD106A02-6215-4501-94CA-2739EAE709C1}" destId="{473F677A-5F86-4A05-A020-9B52205F5E83}" srcOrd="0" destOrd="0" presId="urn:microsoft.com/office/officeart/2005/8/layout/hProcess4"/>
+    <dgm:cxn modelId="{090EBBB5-4B71-41DF-A01F-5E833FA12A54}" type="presOf" srcId="{4D9630B2-2350-41B2-9AE6-FFA1D674999F}" destId="{83B6C606-0024-44D7-BCC8-0305FAF79D37}" srcOrd="1" destOrd="1" presId="urn:microsoft.com/office/officeart/2005/8/layout/hProcess4"/>
+    <dgm:cxn modelId="{92836733-AAA4-4B8C-B3C6-0459FD286510}" type="presOf" srcId="{55334AD3-173A-4A1C-BA17-E44B6DA013B3}" destId="{5B477C0A-EBE8-4554-AF90-A537B9A97AF3}" srcOrd="1" destOrd="0" presId="urn:microsoft.com/office/officeart/2005/8/layout/hProcess4"/>
+    <dgm:cxn modelId="{669EFF54-2225-42E5-BADE-1F181EFFC486}" srcId="{5CC6BBED-AC87-4545-BAEE-FF2A0F4D3F07}" destId="{5370F1C0-987A-4EA2-8B22-B0C9A7765A8F}" srcOrd="1" destOrd="0" parTransId="{3341F762-4F98-44E6-B0A7-8F89C3DCD631}" sibTransId="{BE349B83-97A9-4AAD-98E8-53ADCBD2C61D}"/>
+    <dgm:cxn modelId="{6777FBCD-A956-479B-8976-D15DBC533737}" srcId="{87BD4B6F-D630-472F-8353-00B19E50137B}" destId="{4D9630B2-2350-41B2-9AE6-FFA1D674999F}" srcOrd="1" destOrd="0" parTransId="{A8FF624D-7935-4763-A6C3-75BCA6E6DEF6}" sibTransId="{B8B1A699-8DA3-479A-BB3C-1385B88FCE4B}"/>
+    <dgm:cxn modelId="{A411C6EF-A4BF-4E8E-930D-D2590906BC28}" srcId="{1858F41E-B0BA-4600-A943-81DE031E5BE1}" destId="{55334AD3-173A-4A1C-BA17-E44B6DA013B3}" srcOrd="0" destOrd="0" parTransId="{0F079F3E-E918-41A7-89E3-786EFBF4B923}" sibTransId="{6247BA97-7413-4C8F-96D2-A9D6560AA165}"/>
+    <dgm:cxn modelId="{1E74FAC3-75DB-481A-A75B-858541357BD8}" type="presOf" srcId="{E04A4E85-1077-47C7-9B0F-487F29C75534}" destId="{393CE640-1557-4225-A4C1-46C0D108236E}" srcOrd="0" destOrd="0" presId="urn:microsoft.com/office/officeart/2005/8/layout/hProcess4"/>
+    <dgm:cxn modelId="{A946E019-FD09-4EAB-B66B-73D7C6C1DEEB}" srcId="{5CC6BBED-AC87-4545-BAEE-FF2A0F4D3F07}" destId="{8D70053F-830B-40F3-9B0D-41F4237127B2}" srcOrd="0" destOrd="0" parTransId="{DBDE0353-8652-4F30-9C74-7F93300964BF}" sibTransId="{E03D0B14-CD43-426B-91CC-7F043D35AF00}"/>
+    <dgm:cxn modelId="{C5DC236C-78D4-4353-9474-EF0503629FBF}" type="presOf" srcId="{8B5371D9-60D3-4D83-B3B5-2E8B02ABE5A6}" destId="{5B477C0A-EBE8-4554-AF90-A537B9A97AF3}" srcOrd="1" destOrd="1" presId="urn:microsoft.com/office/officeart/2005/8/layout/hProcess4"/>
+    <dgm:cxn modelId="{4B11A482-A61E-4C9C-ABED-E315204627D9}" type="presOf" srcId="{607C955B-3A62-440C-BA3A-68D799E8A48B}" destId="{E2F4E1F7-B043-4052-8130-06CD2056F834}" srcOrd="0" destOrd="1" presId="urn:microsoft.com/office/officeart/2005/8/layout/hProcess4"/>
+    <dgm:cxn modelId="{1AD5F023-E53A-45DD-92BA-5DA93AD6715E}" srcId="{6A5D37F7-EC83-4980-84EF-9F8F267C8D88}" destId="{1F9B6F6D-8623-4F7E-94B2-5C3A9851F9CE}" srcOrd="0" destOrd="0" parTransId="{9B2D53A8-A5DD-4EE9-8266-51BD381CC417}" sibTransId="{ADD1B31D-0D43-40E0-9A82-9A79D0673185}"/>
+    <dgm:cxn modelId="{FC3183CC-9503-4C74-B62B-C00E381F9F15}" srcId="{E04A4E85-1077-47C7-9B0F-487F29C75534}" destId="{1858F41E-B0BA-4600-A943-81DE031E5BE1}" srcOrd="0" destOrd="0" parTransId="{1C43A182-877A-47BD-85A0-5966F2A1E94E}" sibTransId="{44567BEA-A579-4C61-8639-63B78654D416}"/>
+    <dgm:cxn modelId="{5193EC29-742F-49F3-BBC1-7C62DF123B46}" type="presOf" srcId="{44567BEA-A579-4C61-8639-63B78654D416}" destId="{4FA19D17-4F6A-4352-8E82-51779E218641}" srcOrd="0" destOrd="0" presId="urn:microsoft.com/office/officeart/2005/8/layout/hProcess4"/>
+    <dgm:cxn modelId="{A3ACB21E-797C-4A8C-8343-FF185DC83582}" type="presOf" srcId="{87BD4B6F-D630-472F-8353-00B19E50137B}" destId="{3F59FC73-8DED-436C-AF3E-7F2A96A345F0}" srcOrd="0" destOrd="0" presId="urn:microsoft.com/office/officeart/2005/8/layout/hProcess4"/>
     <dgm:cxn modelId="{D40D639A-6818-416F-86AF-4D5A27A41469}" type="presOf" srcId="{03F80C97-478D-4C67-B13F-14EBB8805D5C}" destId="{83B6C606-0024-44D7-BCC8-0305FAF79D37}" srcOrd="1" destOrd="0" presId="urn:microsoft.com/office/officeart/2005/8/layout/hProcess4"/>
-    <dgm:cxn modelId="{C1B59F88-676A-4D50-BF05-C77C12507069}" type="presOf" srcId="{55334AD3-173A-4A1C-BA17-E44B6DA013B3}" destId="{E101DFCC-1747-4432-8B28-F73A3841A546}" srcOrd="0" destOrd="0" presId="urn:microsoft.com/office/officeart/2005/8/layout/hProcess4"/>
-    <dgm:cxn modelId="{AF413585-ED9B-4E83-8DA4-1C49806C334A}" type="presOf" srcId="{4588A537-56B9-4F2E-B1C2-F8C15C3E0352}" destId="{E101DFCC-1747-4432-8B28-F73A3841A546}" srcOrd="0" destOrd="2" presId="urn:microsoft.com/office/officeart/2005/8/layout/hProcess4"/>
-    <dgm:cxn modelId="{92836733-AAA4-4B8C-B3C6-0459FD286510}" type="presOf" srcId="{55334AD3-173A-4A1C-BA17-E44B6DA013B3}" destId="{5B477C0A-EBE8-4554-AF90-A537B9A97AF3}" srcOrd="1" destOrd="0" presId="urn:microsoft.com/office/officeart/2005/8/layout/hProcess4"/>
-    <dgm:cxn modelId="{1E74FAC3-75DB-481A-A75B-858541357BD8}" type="presOf" srcId="{E04A4E85-1077-47C7-9B0F-487F29C75534}" destId="{393CE640-1557-4225-A4C1-46C0D108236E}" srcOrd="0" destOrd="0" presId="urn:microsoft.com/office/officeart/2005/8/layout/hProcess4"/>
+    <dgm:cxn modelId="{B94229A7-5BD6-4F81-8043-DC930CD13C80}" srcId="{E04A4E85-1077-47C7-9B0F-487F29C75534}" destId="{D800FD87-6220-4750-9CC7-C0C3265BD5ED}" srcOrd="3" destOrd="0" parTransId="{95458B71-C3BE-4A7F-904A-7B29E25BC426}" sibTransId="{5C715AA8-1C71-4869-A01B-9D13710CE975}"/>
+    <dgm:cxn modelId="{1377A4BF-A798-40F0-9C2F-D7C8CAC7D551}" type="presOf" srcId="{8D70053F-830B-40F3-9B0D-41F4237127B2}" destId="{C7789B93-FD76-448B-9A5C-07C7D3725A3C}" srcOrd="0" destOrd="0" presId="urn:microsoft.com/office/officeart/2005/8/layout/hProcess4"/>
+    <dgm:cxn modelId="{21802CBD-B6EE-4C8B-9781-233D17445B7B}" type="presOf" srcId="{5370F1C0-987A-4EA2-8B22-B0C9A7765A8F}" destId="{C7789B93-FD76-448B-9A5C-07C7D3725A3C}" srcOrd="0" destOrd="1" presId="urn:microsoft.com/office/officeart/2005/8/layout/hProcess4"/>
+    <dgm:cxn modelId="{62BC2EE1-63B1-435F-8F1D-067BD5F5BB74}" type="presOf" srcId="{8B5371D9-60D3-4D83-B3B5-2E8B02ABE5A6}" destId="{E101DFCC-1747-4432-8B28-F73A3841A546}" srcOrd="0" destOrd="1" presId="urn:microsoft.com/office/officeart/2005/8/layout/hProcess4"/>
+    <dgm:cxn modelId="{F5D1AB98-91BF-452D-9056-ABF23BABC0AD}" type="presOf" srcId="{D800FD87-6220-4750-9CC7-C0C3265BD5ED}" destId="{805B047A-D693-483F-A25C-15A5785A2784}" srcOrd="0" destOrd="0" presId="urn:microsoft.com/office/officeart/2005/8/layout/hProcess4"/>
+    <dgm:cxn modelId="{275E674E-4519-425B-AC1C-4E7AC7A8BE2E}" type="presOf" srcId="{6A5D37F7-EC83-4980-84EF-9F8F267C8D88}" destId="{58CF326D-AEEF-41B3-9EA6-AF142CFA911E}" srcOrd="0" destOrd="0" presId="urn:microsoft.com/office/officeart/2005/8/layout/hProcess4"/>
+    <dgm:cxn modelId="{4F0C3EEE-D740-4211-BB89-65B994AFC243}" type="presOf" srcId="{39C0D49A-405F-463A-B390-FE360DFE4B4C}" destId="{B178EA76-E479-469E-BA4E-12609F207857}" srcOrd="1" destOrd="1" presId="urn:microsoft.com/office/officeart/2005/8/layout/hProcess4"/>
+    <dgm:cxn modelId="{5237F15A-B079-4AFD-813B-2F1C7300EED6}" srcId="{E04A4E85-1077-47C7-9B0F-487F29C75534}" destId="{87BD4B6F-D630-472F-8353-00B19E50137B}" srcOrd="1" destOrd="0" parTransId="{D2FC3496-3A4A-441B-B2DB-40660AEE8BE9}" sibTransId="{64393453-549D-4407-8EBA-26EEC2B88566}"/>
     <dgm:cxn modelId="{0A59F0FA-39F1-4C5A-9249-F78DA006B8E2}" type="presOf" srcId="{3157C5D2-ED6B-40EC-8A28-60A323105F7D}" destId="{E2F4E1F7-B043-4052-8130-06CD2056F834}" srcOrd="0" destOrd="2" presId="urn:microsoft.com/office/officeart/2005/8/layout/hProcess4"/>
-    <dgm:cxn modelId="{F5D1AB98-91BF-452D-9056-ABF23BABC0AD}" type="presOf" srcId="{D800FD87-6220-4750-9CC7-C0C3265BD5ED}" destId="{805B047A-D693-483F-A25C-15A5785A2784}" srcOrd="0" destOrd="0" presId="urn:microsoft.com/office/officeart/2005/8/layout/hProcess4"/>
-    <dgm:cxn modelId="{4948FDEA-0A9C-4243-846A-69B25D9F57CE}" srcId="{6A5D37F7-EC83-4980-84EF-9F8F267C8D88}" destId="{3157C5D2-ED6B-40EC-8A28-60A323105F7D}" srcOrd="2" destOrd="0" parTransId="{5C07330F-A45C-4A90-AF33-996238292C2B}" sibTransId="{C782C435-F5FA-4AE7-993B-434A126A0862}"/>
-    <dgm:cxn modelId="{090EBBB5-4B71-41DF-A01F-5E833FA12A54}" type="presOf" srcId="{4D9630B2-2350-41B2-9AE6-FFA1D674999F}" destId="{83B6C606-0024-44D7-BCC8-0305FAF79D37}" srcOrd="1" destOrd="1" presId="urn:microsoft.com/office/officeart/2005/8/layout/hProcess4"/>
-    <dgm:cxn modelId="{D2E51AA0-815A-44CA-94B9-4B9F2D4E6BE2}" type="presOf" srcId="{5CC6BBED-AC87-4545-BAEE-FF2A0F4D3F07}" destId="{8F8AA5C5-6C5C-4954-A978-6E18B7094053}" srcOrd="0" destOrd="0" presId="urn:microsoft.com/office/officeart/2005/8/layout/hProcess4"/>
-    <dgm:cxn modelId="{C2A1E115-4A38-461A-A5E9-411D411C32C9}" type="presOf" srcId="{5C715AA8-1C71-4869-A01B-9D13710CE975}" destId="{D91A94C6-C14F-4630-82D6-A7B8B1B1ABA5}" srcOrd="0" destOrd="0" presId="urn:microsoft.com/office/officeart/2005/8/layout/hProcess4"/>
-    <dgm:cxn modelId="{FC3183CC-9503-4C74-B62B-C00E381F9F15}" srcId="{E04A4E85-1077-47C7-9B0F-487F29C75534}" destId="{1858F41E-B0BA-4600-A943-81DE031E5BE1}" srcOrd="0" destOrd="0" parTransId="{1C43A182-877A-47BD-85A0-5966F2A1E94E}" sibTransId="{44567BEA-A579-4C61-8639-63B78654D416}"/>
-    <dgm:cxn modelId="{576B947F-4CCF-4983-BEA3-CEB0EEA3EB86}" type="presOf" srcId="{1F9B6F6D-8623-4F7E-94B2-5C3A9851F9CE}" destId="{E2F4E1F7-B043-4052-8130-06CD2056F834}" srcOrd="0" destOrd="0" presId="urn:microsoft.com/office/officeart/2005/8/layout/hProcess4"/>
-    <dgm:cxn modelId="{A351B0A7-3078-4DBD-A6C7-CC1A5E402240}" srcId="{1858F41E-B0BA-4600-A943-81DE031E5BE1}" destId="{4588A537-56B9-4F2E-B1C2-F8C15C3E0352}" srcOrd="2" destOrd="0" parTransId="{CFCB1028-2F25-48CD-AB35-77E7AF88349D}" sibTransId="{4D9738CF-0793-4A28-B7D6-10FF45C1181E}"/>
-    <dgm:cxn modelId="{4F0C3EEE-D740-4211-BB89-65B994AFC243}" type="presOf" srcId="{39C0D49A-405F-463A-B390-FE360DFE4B4C}" destId="{B178EA76-E479-469E-BA4E-12609F207857}" srcOrd="1" destOrd="1" presId="urn:microsoft.com/office/officeart/2005/8/layout/hProcess4"/>
-    <dgm:cxn modelId="{C5DC236C-78D4-4353-9474-EF0503629FBF}" type="presOf" srcId="{8B5371D9-60D3-4D83-B3B5-2E8B02ABE5A6}" destId="{5B477C0A-EBE8-4554-AF90-A537B9A97AF3}" srcOrd="1" destOrd="1" presId="urn:microsoft.com/office/officeart/2005/8/layout/hProcess4"/>
-    <dgm:cxn modelId="{275E674E-4519-425B-AC1C-4E7AC7A8BE2E}" type="presOf" srcId="{6A5D37F7-EC83-4980-84EF-9F8F267C8D88}" destId="{58CF326D-AEEF-41B3-9EA6-AF142CFA911E}" srcOrd="0" destOrd="0" presId="urn:microsoft.com/office/officeart/2005/8/layout/hProcess4"/>
-    <dgm:cxn modelId="{A5EF33A6-E1C0-481C-A6F1-C86393E8FF36}" type="presOf" srcId="{1858F41E-B0BA-4600-A943-81DE031E5BE1}" destId="{711766B0-CCA6-41DD-86FA-A907B57829EC}" srcOrd="0" destOrd="0" presId="urn:microsoft.com/office/officeart/2005/8/layout/hProcess4"/>
-    <dgm:cxn modelId="{A7D7D2AD-7563-4C37-9125-C11F7D570360}" type="presOf" srcId="{4588A537-56B9-4F2E-B1C2-F8C15C3E0352}" destId="{5B477C0A-EBE8-4554-AF90-A537B9A97AF3}" srcOrd="1" destOrd="2" presId="urn:microsoft.com/office/officeart/2005/8/layout/hProcess4"/>
-    <dgm:cxn modelId="{A3ACB21E-797C-4A8C-8343-FF185DC83582}" type="presOf" srcId="{87BD4B6F-D630-472F-8353-00B19E50137B}" destId="{3F59FC73-8DED-436C-AF3E-7F2A96A345F0}" srcOrd="0" destOrd="0" presId="urn:microsoft.com/office/officeart/2005/8/layout/hProcess4"/>
-    <dgm:cxn modelId="{DD630588-ED57-49C7-84B3-094B4BAEB359}" srcId="{D800FD87-6220-4750-9CC7-C0C3265BD5ED}" destId="{39C0D49A-405F-463A-B390-FE360DFE4B4C}" srcOrd="1" destOrd="0" parTransId="{4011D41C-40D1-4121-B3F9-B567F4A954F6}" sibTransId="{C8C40A60-3C43-46B5-A2BB-09E7462AFCB9}"/>
-    <dgm:cxn modelId="{23A4FADD-070B-4DC5-A2C0-82DD9EB11618}" type="presOf" srcId="{8D70053F-830B-40F3-9B0D-41F4237127B2}" destId="{8BD0305A-E64E-4D62-987A-B210F4E1E393}" srcOrd="1" destOrd="0" presId="urn:microsoft.com/office/officeart/2005/8/layout/hProcess4"/>
-    <dgm:cxn modelId="{4816909C-92F5-46D7-897A-66CB301ED696}" type="presOf" srcId="{1F9B6F6D-8623-4F7E-94B2-5C3A9851F9CE}" destId="{A6A67DEB-89E3-4CE3-A2F6-73364D7D0930}" srcOrd="1" destOrd="0" presId="urn:microsoft.com/office/officeart/2005/8/layout/hProcess4"/>
-    <dgm:cxn modelId="{C9C41B4A-50D0-456A-A084-A055EA9C6021}" srcId="{87BD4B6F-D630-472F-8353-00B19E50137B}" destId="{03F80C97-478D-4C67-B13F-14EBB8805D5C}" srcOrd="0" destOrd="0" parTransId="{B2D96D3F-4507-4D63-BB36-4FDB0E249963}" sibTransId="{7BB07F6E-B506-4462-975D-92E293DED439}"/>
-    <dgm:cxn modelId="{4B11A482-A61E-4C9C-ABED-E315204627D9}" type="presOf" srcId="{607C955B-3A62-440C-BA3A-68D799E8A48B}" destId="{E2F4E1F7-B043-4052-8130-06CD2056F834}" srcOrd="0" destOrd="1" presId="urn:microsoft.com/office/officeart/2005/8/layout/hProcess4"/>
-    <dgm:cxn modelId="{62BC2EE1-63B1-435F-8F1D-067BD5F5BB74}" type="presOf" srcId="{8B5371D9-60D3-4D83-B3B5-2E8B02ABE5A6}" destId="{E101DFCC-1747-4432-8B28-F73A3841A546}" srcOrd="0" destOrd="1" presId="urn:microsoft.com/office/officeart/2005/8/layout/hProcess4"/>
-    <dgm:cxn modelId="{3B93E53D-A372-432A-8099-BF8B99C15C03}" type="presOf" srcId="{607C955B-3A62-440C-BA3A-68D799E8A48B}" destId="{A6A67DEB-89E3-4CE3-A2F6-73364D7D0930}" srcOrd="1" destOrd="1" presId="urn:microsoft.com/office/officeart/2005/8/layout/hProcess4"/>
+    <dgm:cxn modelId="{A45D9E88-0FE6-44B8-B75E-3A45A1E4FBEB}" type="presOf" srcId="{3157C5D2-ED6B-40EC-8A28-60A323105F7D}" destId="{A6A67DEB-89E3-4CE3-A2F6-73364D7D0930}" srcOrd="1" destOrd="2" presId="urn:microsoft.com/office/officeart/2005/8/layout/hProcess4"/>
     <dgm:cxn modelId="{AB3E1156-E2F1-4A4E-9473-11248A4CB337}" type="presOf" srcId="{39C0D49A-405F-463A-B390-FE360DFE4B4C}" destId="{473F677A-5F86-4A05-A020-9B52205F5E83}" srcOrd="0" destOrd="1" presId="urn:microsoft.com/office/officeart/2005/8/layout/hProcess4"/>
-    <dgm:cxn modelId="{414558B7-C55B-4086-9DF9-F5BBDB364310}" type="presOf" srcId="{64393453-549D-4407-8EBA-26EEC2B88566}" destId="{CBC7C94E-BBEC-4573-8225-71814017665B}" srcOrd="0" destOrd="0" presId="urn:microsoft.com/office/officeart/2005/8/layout/hProcess4"/>
-    <dgm:cxn modelId="{669EFF54-2225-42E5-BADE-1F181EFFC486}" srcId="{5CC6BBED-AC87-4545-BAEE-FF2A0F4D3F07}" destId="{5370F1C0-987A-4EA2-8B22-B0C9A7765A8F}" srcOrd="1" destOrd="0" parTransId="{3341F762-4F98-44E6-B0A7-8F89C3DCD631}" sibTransId="{BE349B83-97A9-4AAD-98E8-53ADCBD2C61D}"/>
-    <dgm:cxn modelId="{92EF41C9-EC89-4234-B6AA-E8DB985CDC99}" srcId="{D800FD87-6220-4750-9CC7-C0C3265BD5ED}" destId="{CD106A02-6215-4501-94CA-2739EAE709C1}" srcOrd="0" destOrd="0" parTransId="{497017FC-E48F-430E-A87A-59BA0B55F749}" sibTransId="{061FA615-A06D-4D99-97B5-19323996A3DC}"/>
-    <dgm:cxn modelId="{B94229A7-5BD6-4F81-8043-DC930CD13C80}" srcId="{E04A4E85-1077-47C7-9B0F-487F29C75534}" destId="{D800FD87-6220-4750-9CC7-C0C3265BD5ED}" srcOrd="3" destOrd="0" parTransId="{95458B71-C3BE-4A7F-904A-7B29E25BC426}" sibTransId="{5C715AA8-1C71-4869-A01B-9D13710CE975}"/>
-    <dgm:cxn modelId="{6F1AFB53-F920-4747-9CA8-1D5DA2ABD6B6}" type="presOf" srcId="{5370F1C0-987A-4EA2-8B22-B0C9A7765A8F}" destId="{8BD0305A-E64E-4D62-987A-B210F4E1E393}" srcOrd="1" destOrd="1" presId="urn:microsoft.com/office/officeart/2005/8/layout/hProcess4"/>
-    <dgm:cxn modelId="{9144F25C-9897-47DC-8EEE-AD2C8CB4B3F1}" type="presOf" srcId="{4D9630B2-2350-41B2-9AE6-FFA1D674999F}" destId="{02D98D07-D26D-4347-B376-D5DD10237903}" srcOrd="0" destOrd="1" presId="urn:microsoft.com/office/officeart/2005/8/layout/hProcess4"/>
-    <dgm:cxn modelId="{A45D9E88-0FE6-44B8-B75E-3A45A1E4FBEB}" type="presOf" srcId="{3157C5D2-ED6B-40EC-8A28-60A323105F7D}" destId="{A6A67DEB-89E3-4CE3-A2F6-73364D7D0930}" srcOrd="1" destOrd="2" presId="urn:microsoft.com/office/officeart/2005/8/layout/hProcess4"/>
-    <dgm:cxn modelId="{2ABB1A74-61D9-4674-8D1E-9B2C8C710173}" type="presOf" srcId="{03F80C97-478D-4C67-B13F-14EBB8805D5C}" destId="{02D98D07-D26D-4347-B376-D5DD10237903}" srcOrd="0" destOrd="0" presId="urn:microsoft.com/office/officeart/2005/8/layout/hProcess4"/>
-    <dgm:cxn modelId="{A946E019-FD09-4EAB-B66B-73D7C6C1DEEB}" srcId="{5CC6BBED-AC87-4545-BAEE-FF2A0F4D3F07}" destId="{8D70053F-830B-40F3-9B0D-41F4237127B2}" srcOrd="0" destOrd="0" parTransId="{DBDE0353-8652-4F30-9C74-7F93300964BF}" sibTransId="{E03D0B14-CD43-426B-91CC-7F043D35AF00}"/>
-    <dgm:cxn modelId="{5237F15A-B079-4AFD-813B-2F1C7300EED6}" srcId="{E04A4E85-1077-47C7-9B0F-487F29C75534}" destId="{87BD4B6F-D630-472F-8353-00B19E50137B}" srcOrd="1" destOrd="0" parTransId="{D2FC3496-3A4A-441B-B2DB-40660AEE8BE9}" sibTransId="{64393453-549D-4407-8EBA-26EEC2B88566}"/>
-    <dgm:cxn modelId="{7D1653FF-2ACE-4196-AB84-A4E50CB39DED}" srcId="{E04A4E85-1077-47C7-9B0F-487F29C75534}" destId="{5CC6BBED-AC87-4545-BAEE-FF2A0F4D3F07}" srcOrd="2" destOrd="0" parTransId="{06408262-1922-47F8-9E9F-15CF6AAEF1D0}" sibTransId="{D13602AF-472E-404C-A3EA-26CE1625C3D3}"/>
-    <dgm:cxn modelId="{21802CBD-B6EE-4C8B-9781-233D17445B7B}" type="presOf" srcId="{5370F1C0-987A-4EA2-8B22-B0C9A7765A8F}" destId="{C7789B93-FD76-448B-9A5C-07C7D3725A3C}" srcOrd="0" destOrd="1" presId="urn:microsoft.com/office/officeart/2005/8/layout/hProcess4"/>
-    <dgm:cxn modelId="{36A272B5-220B-4AD1-9357-C1B62B72CA70}" type="presOf" srcId="{CD106A02-6215-4501-94CA-2739EAE709C1}" destId="{B178EA76-E479-469E-BA4E-12609F207857}" srcOrd="1" destOrd="0" presId="urn:microsoft.com/office/officeart/2005/8/layout/hProcess4"/>
-    <dgm:cxn modelId="{5193EC29-742F-49F3-BBC1-7C62DF123B46}" type="presOf" srcId="{44567BEA-A579-4C61-8639-63B78654D416}" destId="{4FA19D17-4F6A-4352-8E82-51779E218641}" srcOrd="0" destOrd="0" presId="urn:microsoft.com/office/officeart/2005/8/layout/hProcess4"/>
-    <dgm:cxn modelId="{1377A4BF-A798-40F0-9C2F-D7C8CAC7D551}" type="presOf" srcId="{8D70053F-830B-40F3-9B0D-41F4237127B2}" destId="{C7789B93-FD76-448B-9A5C-07C7D3725A3C}" srcOrd="0" destOrd="0" presId="urn:microsoft.com/office/officeart/2005/8/layout/hProcess4"/>
     <dgm:cxn modelId="{6B9E3025-4430-4B19-B2CB-10FB81204E08}" srcId="{E04A4E85-1077-47C7-9B0F-487F29C75534}" destId="{6A5D37F7-EC83-4980-84EF-9F8F267C8D88}" srcOrd="4" destOrd="0" parTransId="{F38645F6-ED86-4A34-90BA-A95588C42DA7}" sibTransId="{81CEB423-645A-4CA0-BCB5-44BD615714FE}"/>
-    <dgm:cxn modelId="{6777FBCD-A956-479B-8976-D15DBC533737}" srcId="{87BD4B6F-D630-472F-8353-00B19E50137B}" destId="{4D9630B2-2350-41B2-9AE6-FFA1D674999F}" srcOrd="1" destOrd="0" parTransId="{A8FF624D-7935-4763-A6C3-75BCA6E6DEF6}" sibTransId="{B8B1A699-8DA3-479A-BB3C-1385B88FCE4B}"/>
-    <dgm:cxn modelId="{1AD5F023-E53A-45DD-92BA-5DA93AD6715E}" srcId="{6A5D37F7-EC83-4980-84EF-9F8F267C8D88}" destId="{1F9B6F6D-8623-4F7E-94B2-5C3A9851F9CE}" srcOrd="0" destOrd="0" parTransId="{9B2D53A8-A5DD-4EE9-8266-51BD381CC417}" sibTransId="{ADD1B31D-0D43-40E0-9A82-9A79D0673185}"/>
-    <dgm:cxn modelId="{A411C6EF-A4BF-4E8E-930D-D2590906BC28}" srcId="{1858F41E-B0BA-4600-A943-81DE031E5BE1}" destId="{55334AD3-173A-4A1C-BA17-E44B6DA013B3}" srcOrd="0" destOrd="0" parTransId="{0F079F3E-E918-41A7-89E3-786EFBF4B923}" sibTransId="{6247BA97-7413-4C8F-96D2-A9D6560AA165}"/>
-    <dgm:cxn modelId="{0DE1679D-0556-4D0B-A7C3-F38695BD2611}" type="presOf" srcId="{CD106A02-6215-4501-94CA-2739EAE709C1}" destId="{473F677A-5F86-4A05-A020-9B52205F5E83}" srcOrd="0" destOrd="0" presId="urn:microsoft.com/office/officeart/2005/8/layout/hProcess4"/>
     <dgm:cxn modelId="{82F65DE0-AFD6-4C4B-91E1-799B82AA0D47}" type="presParOf" srcId="{393CE640-1557-4225-A4C1-46C0D108236E}" destId="{60838942-8CFC-4677-9766-0D69F95F91A1}" srcOrd="0" destOrd="0" presId="urn:microsoft.com/office/officeart/2005/8/layout/hProcess4"/>
     <dgm:cxn modelId="{B0B987AC-6622-4B9C-8565-BA08399AF601}" type="presParOf" srcId="{393CE640-1557-4225-A4C1-46C0D108236E}" destId="{19E36AB4-6674-4E9E-A74B-49E2673B0946}" srcOrd="1" destOrd="0" presId="urn:microsoft.com/office/officeart/2005/8/layout/hProcess4"/>
     <dgm:cxn modelId="{5F358813-115B-494C-91F8-2ABB4E9D525B}" type="presParOf" srcId="{393CE640-1557-4225-A4C1-46C0D108236E}" destId="{E1D9359B-BF6C-4FD7-9711-26A7FDD18728}" srcOrd="2" destOrd="0" presId="urn:microsoft.com/office/officeart/2005/8/layout/hProcess4"/>
@@ -23618,8 +23755,8 @@
       </dsp:nvSpPr>
       <dsp:spPr>
         <a:xfrm>
-          <a:off x="1023" y="2156393"/>
-          <a:ext cx="1340799" cy="1105879"/>
+          <a:off x="2858" y="2597293"/>
+          <a:ext cx="1708811" cy="1409412"/>
         </a:xfrm>
         <a:prstGeom prst="roundRect">
           <a:avLst>
@@ -23696,33 +23833,14 @@
           </a:pPr>
           <a:r>
             <a:rPr lang="de-DE" sz="1100" kern="1200" dirty="0" smtClean="0"/>
-            <a:t>Potentiell oder</a:t>
-          </a:r>
-          <a:endParaRPr lang="de-DE" sz="1100" kern="1200" dirty="0"/>
-        </a:p>
-        <a:p>
-          <a:pPr marL="57150" lvl="1" indent="-57150" algn="l" defTabSz="488950">
-            <a:lnSpc>
-              <a:spcPct val="90000"/>
-            </a:lnSpc>
-            <a:spcBef>
-              <a:spcPct val="0"/>
-            </a:spcBef>
-            <a:spcAft>
-              <a:spcPct val="15000"/>
-            </a:spcAft>
-            <a:buChar char="••"/>
-          </a:pPr>
-          <a:r>
-            <a:rPr lang="de-DE" sz="1100" kern="1200" dirty="0" smtClean="0"/>
-            <a:t>Tatsächlich</a:t>
+            <a:t>Fehlkommunikation</a:t>
           </a:r>
           <a:endParaRPr lang="de-DE" sz="1100" kern="1200" dirty="0"/>
         </a:p>
       </dsp:txBody>
       <dsp:txXfrm>
-        <a:off x="26472" y="2181842"/>
-        <a:ext cx="1289901" cy="818006"/>
+        <a:off x="35292" y="2629727"/>
+        <a:ext cx="1643943" cy="1042527"/>
       </dsp:txXfrm>
     </dsp:sp>
     <dsp:sp modelId="{4FA19D17-4F6A-4352-8E82-51779E218641}">
@@ -23732,16 +23850,16 @@
       </dsp:nvSpPr>
       <dsp:spPr>
         <a:xfrm>
-          <a:off x="770500" y="2477185"/>
-          <a:ext cx="1393848" cy="1393848"/>
+          <a:off x="980245" y="2994313"/>
+          <a:ext cx="1793881" cy="1793881"/>
         </a:xfrm>
         <a:prstGeom prst="leftCircularArrow">
           <a:avLst>
-            <a:gd name="adj1" fmla="val 2550"/>
-            <a:gd name="adj2" fmla="val 309429"/>
-            <a:gd name="adj3" fmla="val 2084940"/>
+            <a:gd name="adj1" fmla="val 2653"/>
+            <a:gd name="adj2" fmla="val 322637"/>
+            <a:gd name="adj3" fmla="val 2098148"/>
             <a:gd name="adj4" fmla="val 9024489"/>
-            <a:gd name="adj5" fmla="val 2975"/>
+            <a:gd name="adj5" fmla="val 3095"/>
           </a:avLst>
         </a:prstGeom>
         <a:solidFill>
@@ -23779,8 +23897,8 @@
       </dsp:nvSpPr>
       <dsp:spPr>
         <a:xfrm>
-          <a:off x="298978" y="3025298"/>
-          <a:ext cx="1191821" cy="473948"/>
+          <a:off x="382594" y="3704688"/>
+          <a:ext cx="1518943" cy="604033"/>
         </a:xfrm>
         <a:prstGeom prst="roundRect">
           <a:avLst>
@@ -23824,12 +23942,12 @@
         </a:fontRef>
       </dsp:style>
       <dsp:txBody>
-        <a:bodyPr spcFirstLastPara="0" vert="horz" wrap="square" lIns="30480" tIns="20320" rIns="30480" bIns="20320" numCol="1" spcCol="1270" anchor="ctr" anchorCtr="0">
+        <a:bodyPr spcFirstLastPara="0" vert="horz" wrap="square" lIns="40005" tIns="26670" rIns="40005" bIns="26670" numCol="1" spcCol="1270" anchor="ctr" anchorCtr="0">
           <a:noAutofit/>
         </a:bodyPr>
         <a:lstStyle/>
         <a:p>
-          <a:pPr lvl="0" algn="ctr" defTabSz="711200">
+          <a:pPr lvl="0" algn="ctr" defTabSz="933450">
             <a:lnSpc>
               <a:spcPct val="90000"/>
             </a:lnSpc>
@@ -23841,15 +23959,15 @@
             </a:spcAft>
           </a:pPr>
           <a:r>
-            <a:rPr lang="de-DE" sz="1600" kern="1200" dirty="0" smtClean="0"/>
+            <a:rPr lang="de-DE" sz="2100" kern="1200" dirty="0" smtClean="0"/>
             <a:t>Fehler</a:t>
           </a:r>
-          <a:endParaRPr lang="de-DE" sz="1600" kern="1200" dirty="0"/>
+          <a:endParaRPr lang="de-DE" sz="2100" kern="1200" dirty="0"/>
         </a:p>
       </dsp:txBody>
       <dsp:txXfrm>
-        <a:off x="312859" y="3039179"/>
-        <a:ext cx="1164059" cy="446186"/>
+        <a:off x="400286" y="3722380"/>
+        <a:ext cx="1483559" cy="568649"/>
       </dsp:txXfrm>
     </dsp:sp>
     <dsp:sp modelId="{02D98D07-D26D-4347-B376-D5DD10237903}">
@@ -23859,8 +23977,8 @@
       </dsp:nvSpPr>
       <dsp:spPr>
         <a:xfrm>
-          <a:off x="1660067" y="2156393"/>
-          <a:ext cx="1340799" cy="1105879"/>
+          <a:off x="2128143" y="2597293"/>
+          <a:ext cx="1708811" cy="1409412"/>
         </a:xfrm>
         <a:prstGeom prst="roundRect">
           <a:avLst>
@@ -23922,7 +24040,7 @@
           </a:pPr>
           <a:r>
             <a:rPr lang="de-DE" sz="1100" kern="1200" dirty="0" smtClean="0"/>
-            <a:t>Verlust von Arbeitszeit</a:t>
+            <a:t>Arbeit wird doppelt ausgeführt</a:t>
           </a:r>
           <a:endParaRPr lang="de-DE" sz="1100" kern="1200" dirty="0"/>
         </a:p>
@@ -23941,14 +24059,18 @@
           </a:pPr>
           <a:r>
             <a:rPr lang="de-DE" sz="1100" kern="1200" dirty="0" smtClean="0"/>
-            <a:t>Überflüssige Ausgabe</a:t>
+            <a:t>Überflüssige </a:t>
+          </a:r>
+          <a:r>
+            <a:rPr lang="de-DE" sz="1100" kern="1200" dirty="0" smtClean="0"/>
+            <a:t>Kosten und Personalaufwand</a:t>
           </a:r>
           <a:endParaRPr lang="de-DE" sz="1100" kern="1200" dirty="0"/>
         </a:p>
       </dsp:txBody>
       <dsp:txXfrm>
-        <a:off x="1685516" y="2418817"/>
-        <a:ext cx="1289901" cy="818006"/>
+        <a:off x="2160577" y="2931744"/>
+        <a:ext cx="1643943" cy="1042527"/>
       </dsp:txXfrm>
     </dsp:sp>
     <dsp:sp modelId="{CBC7C94E-BBEC-4573-8225-71814017665B}">
@@ -23958,16 +24080,16 @@
       </dsp:nvSpPr>
       <dsp:spPr>
         <a:xfrm>
-          <a:off x="2418371" y="1504272"/>
-          <a:ext cx="1565172" cy="1565172"/>
+          <a:off x="3091289" y="1760542"/>
+          <a:ext cx="2012229" cy="2012229"/>
         </a:xfrm>
         <a:prstGeom prst="circularArrow">
           <a:avLst>
-            <a:gd name="adj1" fmla="val 2271"/>
-            <a:gd name="adj2" fmla="val 273786"/>
-            <a:gd name="adj3" fmla="val 19550703"/>
+            <a:gd name="adj1" fmla="val 2365"/>
+            <a:gd name="adj2" fmla="val 285714"/>
+            <a:gd name="adj3" fmla="val 19538775"/>
             <a:gd name="adj4" fmla="val 12575511"/>
-            <a:gd name="adj5" fmla="val 2650"/>
+            <a:gd name="adj5" fmla="val 2759"/>
           </a:avLst>
         </a:prstGeom>
         <a:solidFill>
@@ -24005,8 +24127,8 @@
       </dsp:nvSpPr>
       <dsp:spPr>
         <a:xfrm>
-          <a:off x="1958022" y="1919419"/>
-          <a:ext cx="1191821" cy="473948"/>
+          <a:off x="2507878" y="2295276"/>
+          <a:ext cx="1518943" cy="604033"/>
         </a:xfrm>
         <a:prstGeom prst="roundRect">
           <a:avLst>
@@ -24050,12 +24172,12 @@
         </a:fontRef>
       </dsp:style>
       <dsp:txBody>
-        <a:bodyPr spcFirstLastPara="0" vert="horz" wrap="square" lIns="30480" tIns="20320" rIns="30480" bIns="20320" numCol="1" spcCol="1270" anchor="ctr" anchorCtr="0">
+        <a:bodyPr spcFirstLastPara="0" vert="horz" wrap="square" lIns="40005" tIns="26670" rIns="40005" bIns="26670" numCol="1" spcCol="1270" anchor="ctr" anchorCtr="0">
           <a:noAutofit/>
         </a:bodyPr>
         <a:lstStyle/>
         <a:p>
-          <a:pPr lvl="0" algn="ctr" defTabSz="711200">
+          <a:pPr lvl="0" algn="ctr" defTabSz="933450">
             <a:lnSpc>
               <a:spcPct val="90000"/>
             </a:lnSpc>
@@ -24067,15 +24189,15 @@
             </a:spcAft>
           </a:pPr>
           <a:r>
-            <a:rPr lang="de-DE" sz="1600" kern="1200" dirty="0" smtClean="0"/>
+            <a:rPr lang="de-DE" sz="2100" kern="1200" dirty="0" smtClean="0"/>
             <a:t>Folgen</a:t>
           </a:r>
-          <a:endParaRPr lang="de-DE" sz="1600" kern="1200" dirty="0"/>
+          <a:endParaRPr lang="de-DE" sz="2100" kern="1200" dirty="0"/>
         </a:p>
       </dsp:txBody>
       <dsp:txXfrm>
-        <a:off x="1971903" y="1933300"/>
-        <a:ext cx="1164059" cy="446186"/>
+        <a:off x="2525570" y="2312968"/>
+        <a:ext cx="1483559" cy="568649"/>
       </dsp:txXfrm>
     </dsp:sp>
     <dsp:sp modelId="{C7789B93-FD76-448B-9A5C-07C7D3725A3C}">
@@ -24085,8 +24207,8 @@
       </dsp:nvSpPr>
       <dsp:spPr>
         <a:xfrm>
-          <a:off x="3319111" y="2156393"/>
-          <a:ext cx="1340799" cy="1105879"/>
+          <a:off x="4253427" y="2597293"/>
+          <a:ext cx="1708811" cy="1409412"/>
         </a:xfrm>
         <a:prstGeom prst="roundRect">
           <a:avLst>
@@ -24163,14 +24285,14 @@
           </a:pPr>
           <a:r>
             <a:rPr lang="de-DE" sz="1100" kern="1200" dirty="0" smtClean="0"/>
-            <a:t>Fehlkommunikation</a:t>
+            <a:t>Unklare Aufgabenverteilung</a:t>
           </a:r>
           <a:endParaRPr lang="de-DE" sz="1100" kern="1200" dirty="0"/>
         </a:p>
       </dsp:txBody>
       <dsp:txXfrm>
-        <a:off x="3344560" y="2181842"/>
-        <a:ext cx="1289901" cy="818006"/>
+        <a:off x="4285861" y="2629727"/>
+        <a:ext cx="1643943" cy="1042527"/>
       </dsp:txXfrm>
     </dsp:sp>
     <dsp:sp modelId="{F71DF23A-208F-4CA4-9D7D-547D97BDB3CA}">
@@ -24180,16 +24302,16 @@
       </dsp:nvSpPr>
       <dsp:spPr>
         <a:xfrm>
-          <a:off x="4088589" y="2477185"/>
-          <a:ext cx="1393848" cy="1393848"/>
+          <a:off x="5230814" y="2994313"/>
+          <a:ext cx="1793881" cy="1793881"/>
         </a:xfrm>
         <a:prstGeom prst="leftCircularArrow">
           <a:avLst>
-            <a:gd name="adj1" fmla="val 2550"/>
-            <a:gd name="adj2" fmla="val 309429"/>
-            <a:gd name="adj3" fmla="val 2084940"/>
+            <a:gd name="adj1" fmla="val 2653"/>
+            <a:gd name="adj2" fmla="val 322637"/>
+            <a:gd name="adj3" fmla="val 2098148"/>
             <a:gd name="adj4" fmla="val 9024489"/>
-            <a:gd name="adj5" fmla="val 2975"/>
+            <a:gd name="adj5" fmla="val 3095"/>
           </a:avLst>
         </a:prstGeom>
         <a:solidFill>
@@ -24227,8 +24349,8 @@
       </dsp:nvSpPr>
       <dsp:spPr>
         <a:xfrm>
-          <a:off x="3617066" y="3025298"/>
-          <a:ext cx="1191821" cy="473948"/>
+          <a:off x="4633163" y="3704688"/>
+          <a:ext cx="1518943" cy="604033"/>
         </a:xfrm>
         <a:prstGeom prst="roundRect">
           <a:avLst>
@@ -24272,12 +24394,12 @@
         </a:fontRef>
       </dsp:style>
       <dsp:txBody>
-        <a:bodyPr spcFirstLastPara="0" vert="horz" wrap="square" lIns="30480" tIns="20320" rIns="30480" bIns="20320" numCol="1" spcCol="1270" anchor="ctr" anchorCtr="0">
+        <a:bodyPr spcFirstLastPara="0" vert="horz" wrap="square" lIns="40005" tIns="26670" rIns="40005" bIns="26670" numCol="1" spcCol="1270" anchor="ctr" anchorCtr="0">
           <a:noAutofit/>
         </a:bodyPr>
         <a:lstStyle/>
         <a:p>
-          <a:pPr lvl="0" algn="ctr" defTabSz="711200">
+          <a:pPr lvl="0" algn="ctr" defTabSz="933450">
             <a:lnSpc>
               <a:spcPct val="90000"/>
             </a:lnSpc>
@@ -24289,15 +24411,15 @@
             </a:spcAft>
           </a:pPr>
           <a:r>
-            <a:rPr lang="de-DE" sz="1600" kern="1200" dirty="0" smtClean="0"/>
+            <a:rPr lang="de-DE" sz="2100" kern="1200" dirty="0" smtClean="0"/>
             <a:t>Ursache</a:t>
           </a:r>
-          <a:endParaRPr lang="de-DE" sz="1600" kern="1200" dirty="0"/>
+          <a:endParaRPr lang="de-DE" sz="2100" kern="1200" dirty="0"/>
         </a:p>
       </dsp:txBody>
       <dsp:txXfrm>
-        <a:off x="3630947" y="3039179"/>
-        <a:ext cx="1164059" cy="446186"/>
+        <a:off x="4650855" y="3722380"/>
+        <a:ext cx="1483559" cy="568649"/>
       </dsp:txXfrm>
     </dsp:sp>
     <dsp:sp modelId="{473F677A-5F86-4A05-A020-9B52205F5E83}">
@@ -24307,8 +24429,8 @@
       </dsp:nvSpPr>
       <dsp:spPr>
         <a:xfrm>
-          <a:off x="4978155" y="2156393"/>
-          <a:ext cx="1340799" cy="1105879"/>
+          <a:off x="6378711" y="2597293"/>
+          <a:ext cx="1708811" cy="1409412"/>
         </a:xfrm>
         <a:prstGeom prst="roundRect">
           <a:avLst>
@@ -24395,8 +24517,8 @@
         </a:p>
       </dsp:txBody>
       <dsp:txXfrm>
-        <a:off x="5003604" y="2418817"/>
-        <a:ext cx="1289901" cy="818006"/>
+        <a:off x="6411145" y="2931744"/>
+        <a:ext cx="1643943" cy="1042527"/>
       </dsp:txXfrm>
     </dsp:sp>
     <dsp:sp modelId="{D91A94C6-C14F-4630-82D6-A7B8B1B1ABA5}">
@@ -24406,16 +24528,16 @@
       </dsp:nvSpPr>
       <dsp:spPr>
         <a:xfrm>
-          <a:off x="5736459" y="1504272"/>
-          <a:ext cx="1565172" cy="1565172"/>
+          <a:off x="7341858" y="1760542"/>
+          <a:ext cx="2012229" cy="2012229"/>
         </a:xfrm>
         <a:prstGeom prst="circularArrow">
           <a:avLst>
-            <a:gd name="adj1" fmla="val 2271"/>
-            <a:gd name="adj2" fmla="val 273786"/>
-            <a:gd name="adj3" fmla="val 19550703"/>
+            <a:gd name="adj1" fmla="val 2365"/>
+            <a:gd name="adj2" fmla="val 285714"/>
+            <a:gd name="adj3" fmla="val 19538775"/>
             <a:gd name="adj4" fmla="val 12575511"/>
-            <a:gd name="adj5" fmla="val 2650"/>
+            <a:gd name="adj5" fmla="val 2759"/>
           </a:avLst>
         </a:prstGeom>
         <a:solidFill>
@@ -24453,8 +24575,8 @@
       </dsp:nvSpPr>
       <dsp:spPr>
         <a:xfrm>
-          <a:off x="5276111" y="1919419"/>
-          <a:ext cx="1191821" cy="473948"/>
+          <a:off x="6758447" y="2295276"/>
+          <a:ext cx="1518943" cy="604033"/>
         </a:xfrm>
         <a:prstGeom prst="roundRect">
           <a:avLst>
@@ -24498,12 +24620,12 @@
         </a:fontRef>
       </dsp:style>
       <dsp:txBody>
-        <a:bodyPr spcFirstLastPara="0" vert="horz" wrap="square" lIns="30480" tIns="20320" rIns="30480" bIns="20320" numCol="1" spcCol="1270" anchor="ctr" anchorCtr="0">
+        <a:bodyPr spcFirstLastPara="0" vert="horz" wrap="square" lIns="40005" tIns="26670" rIns="40005" bIns="26670" numCol="1" spcCol="1270" anchor="ctr" anchorCtr="0">
           <a:noAutofit/>
         </a:bodyPr>
         <a:lstStyle/>
         <a:p>
-          <a:pPr lvl="0" algn="ctr" defTabSz="711200">
+          <a:pPr lvl="0" algn="ctr" defTabSz="933450">
             <a:lnSpc>
               <a:spcPct val="90000"/>
             </a:lnSpc>
@@ -24515,15 +24637,15 @@
             </a:spcAft>
           </a:pPr>
           <a:r>
-            <a:rPr lang="de-DE" sz="1600" kern="1200" dirty="0" smtClean="0"/>
+            <a:rPr lang="de-DE" sz="2100" kern="1200" dirty="0" smtClean="0"/>
             <a:t>Risiko</a:t>
           </a:r>
-          <a:endParaRPr lang="de-DE" sz="1600" kern="1200" dirty="0"/>
+          <a:endParaRPr lang="de-DE" sz="2100" kern="1200" dirty="0"/>
         </a:p>
       </dsp:txBody>
       <dsp:txXfrm>
-        <a:off x="5289992" y="1933300"/>
-        <a:ext cx="1164059" cy="446186"/>
+        <a:off x="6776139" y="2312968"/>
+        <a:ext cx="1483559" cy="568649"/>
       </dsp:txXfrm>
     </dsp:sp>
     <dsp:sp modelId="{E2F4E1F7-B043-4052-8130-06CD2056F834}">
@@ -24533,8 +24655,8 @@
       </dsp:nvSpPr>
       <dsp:spPr>
         <a:xfrm>
-          <a:off x="6637199" y="2156393"/>
-          <a:ext cx="1340799" cy="1105879"/>
+          <a:off x="8503995" y="2597293"/>
+          <a:ext cx="1708811" cy="1409412"/>
         </a:xfrm>
         <a:prstGeom prst="roundRect">
           <a:avLst>
@@ -24634,10 +24756,29 @@
           </a:r>
           <a:endParaRPr lang="de-DE" sz="1100" kern="1200" dirty="0"/>
         </a:p>
+        <a:p>
+          <a:pPr marL="57150" lvl="1" indent="-57150" algn="l" defTabSz="488950">
+            <a:lnSpc>
+              <a:spcPct val="90000"/>
+            </a:lnSpc>
+            <a:spcBef>
+              <a:spcPct val="0"/>
+            </a:spcBef>
+            <a:spcAft>
+              <a:spcPct val="15000"/>
+            </a:spcAft>
+            <a:buChar char="••"/>
+          </a:pPr>
+          <a:r>
+            <a:rPr lang="de-DE" sz="1100" kern="1200" dirty="0" smtClean="0"/>
+            <a:t>Aufgabenverteilung verbessern</a:t>
+          </a:r>
+          <a:endParaRPr lang="de-DE" sz="1100" kern="1200" dirty="0"/>
+        </a:p>
       </dsp:txBody>
       <dsp:txXfrm>
-        <a:off x="6662648" y="2181842"/>
-        <a:ext cx="1289901" cy="818006"/>
+        <a:off x="8536429" y="2629727"/>
+        <a:ext cx="1643943" cy="1042527"/>
       </dsp:txXfrm>
     </dsp:sp>
     <dsp:sp modelId="{58CF326D-AEEF-41B3-9EA6-AF142CFA911E}">
@@ -24647,8 +24788,8 @@
       </dsp:nvSpPr>
       <dsp:spPr>
         <a:xfrm>
-          <a:off x="6935155" y="3025298"/>
-          <a:ext cx="1191821" cy="473948"/>
+          <a:off x="8883731" y="3704688"/>
+          <a:ext cx="1518943" cy="604033"/>
         </a:xfrm>
         <a:prstGeom prst="roundRect">
           <a:avLst>
@@ -24692,12 +24833,12 @@
         </a:fontRef>
       </dsp:style>
       <dsp:txBody>
-        <a:bodyPr spcFirstLastPara="0" vert="horz" wrap="square" lIns="30480" tIns="20320" rIns="30480" bIns="20320" numCol="1" spcCol="1270" anchor="ctr" anchorCtr="0">
+        <a:bodyPr spcFirstLastPara="0" vert="horz" wrap="square" lIns="40005" tIns="26670" rIns="40005" bIns="26670" numCol="1" spcCol="1270" anchor="ctr" anchorCtr="0">
           <a:noAutofit/>
         </a:bodyPr>
         <a:lstStyle/>
         <a:p>
-          <a:pPr lvl="0" algn="ctr" defTabSz="711200">
+          <a:pPr lvl="0" algn="ctr" defTabSz="933450">
             <a:lnSpc>
               <a:spcPct val="90000"/>
             </a:lnSpc>
@@ -24709,15 +24850,15 @@
             </a:spcAft>
           </a:pPr>
           <a:r>
-            <a:rPr lang="de-DE" sz="1600" kern="1200" dirty="0" smtClean="0"/>
+            <a:rPr lang="de-DE" sz="2100" kern="1200" dirty="0" smtClean="0"/>
             <a:t>Maßnahmen</a:t>
           </a:r>
-          <a:endParaRPr lang="de-DE" sz="1600" kern="1200" dirty="0"/>
+          <a:endParaRPr lang="de-DE" sz="2100" kern="1200" dirty="0"/>
         </a:p>
       </dsp:txBody>
       <dsp:txXfrm>
-        <a:off x="6949036" y="3039179"/>
-        <a:ext cx="1164059" cy="446186"/>
+        <a:off x="8901423" y="3722380"/>
+        <a:ext cx="1483559" cy="568649"/>
       </dsp:txXfrm>
     </dsp:sp>
   </dsp:spTree>
@@ -45612,7 +45753,7 @@
           <p:nvPr>
             <p:extLst>
               <p:ext uri="{386F3935-93C4-4BCD-93E2-E3B085C9AB24}">
-                <p16:designElem xmlns:p16="http://schemas.microsoft.com/office/powerpoint/2015/main" xmlns="" val="1"/>
+                <p16:designElem xmlns="" xmlns:p16="http://schemas.microsoft.com/office/powerpoint/2015/main" val="1"/>
               </p:ext>
             </p:extLst>
           </p:nvPr>
@@ -45745,7 +45886,7 @@
           <p:nvPr>
             <p:extLst>
               <p:ext uri="{386F3935-93C4-4BCD-93E2-E3B085C9AB24}">
-                <p16:designElem xmlns:p16="http://schemas.microsoft.com/office/powerpoint/2015/main" xmlns="" val="1"/>
+                <p16:designElem xmlns="" xmlns:p16="http://schemas.microsoft.com/office/powerpoint/2015/main" val="1"/>
               </p:ext>
             </p:extLst>
           </p:nvPr>
@@ -46231,14 +46372,14 @@
           <p:nvPr>
             <p:extLst>
               <p:ext uri="{D42A27DB-BD31-4B8C-83A1-F6EECF244321}">
-                <p14:modId xmlns:p14="http://schemas.microsoft.com/office/powerpoint/2010/main" val="910102931"/>
+                <p14:modId xmlns:p14="http://schemas.microsoft.com/office/powerpoint/2010/main" val="3688733992"/>
               </p:ext>
             </p:extLst>
           </p:nvPr>
         </p:nvGraphicFramePr>
         <p:xfrm>
-          <a:off x="2032000" y="821266"/>
-          <a:ext cx="8128000" cy="5418667"/>
+          <a:off x="880533" y="254001"/>
+          <a:ext cx="10405534" cy="6603999"/>
         </p:xfrm>
         <a:graphic>
           <a:graphicData uri="http://schemas.openxmlformats.org/drawingml/2006/diagram">
@@ -48744,7 +48885,7 @@
           <p:nvPr>
             <p:extLst>
               <p:ext uri="{386F3935-93C4-4BCD-93E2-E3B085C9AB24}">
-                <p16:designElem xmlns:p16="http://schemas.microsoft.com/office/powerpoint/2015/main" xmlns="" val="1"/>
+                <p16:designElem xmlns="" xmlns:p16="http://schemas.microsoft.com/office/powerpoint/2015/main" val="1"/>
               </p:ext>
             </p:extLst>
           </p:nvPr>
@@ -49915,7 +50056,7 @@
   <a:extraClrSchemeLst/>
   <a:extLst>
     <a:ext uri="{05A4C25C-085E-4340-85A3-A5531E510DB2}">
-      <thm15:themeFamily xmlns:thm15="http://schemas.microsoft.com/office/thememl/2012/main" xmlns="" name="Office Theme" id="{62F939B6-93AF-4DB8-9C6B-D6C7DFDC589F}" vid="{4A3C46E8-61CC-4603-A589-7422A47A8E4A}"/>
+      <thm15:themeFamily xmlns="" xmlns:thm15="http://schemas.microsoft.com/office/thememl/2012/main" name="Office Theme" id="{62F939B6-93AF-4DB8-9C6B-D6C7DFDC589F}" vid="{4A3C46E8-61CC-4603-A589-7422A47A8E4A}"/>
     </a:ext>
   </a:extLst>
 </a:theme>
@@ -50210,7 +50351,7 @@
   <a:extraClrSchemeLst/>
   <a:extLst>
     <a:ext uri="{05A4C25C-085E-4340-85A3-A5531E510DB2}">
-      <thm15:themeFamily xmlns:thm15="http://schemas.microsoft.com/office/thememl/2012/main" xmlns="" name="Office Theme" id="{62F939B6-93AF-4DB8-9C6B-D6C7DFDC589F}" vid="{4A3C46E8-61CC-4603-A589-7422A47A8E4A}"/>
+      <thm15:themeFamily xmlns="" xmlns:thm15="http://schemas.microsoft.com/office/thememl/2012/main" name="Office Theme" id="{62F939B6-93AF-4DB8-9C6B-D6C7DFDC589F}" vid="{4A3C46E8-61CC-4603-A589-7422A47A8E4A}"/>
     </a:ext>
   </a:extLst>
 </a:theme>

</xml_diff>